<commit_message>
Impact Slides updated to 3 column variant
</commit_message>
<xml_diff>
--- a/template/_template.pptx
+++ b/template/_template.pptx
@@ -785,7 +785,7 @@
           <a:p>
             <a:fld id="{173DEA02-80BC-4B4A-88AA-63BCC9943E88}" type="datetime3">
               <a:rPr lang="en-US" smtClean="0"/>
-              <a:t>25 August 2023</a:t>
+              <a:t>30 August 2023</a:t>
             </a:fld>
             <a:endParaRPr lang="en-GB" dirty="0"/>
           </a:p>
@@ -5785,7 +5785,7 @@
           <a:p>
             <a:fld id="{173DEA02-80BC-4B4A-88AA-63BCC9943E88}" type="datetime3">
               <a:rPr lang="en-US" smtClean="0"/>
-              <a:t>25 August 2023</a:t>
+              <a:t>30 August 2023</a:t>
             </a:fld>
             <a:endParaRPr lang="en-GB" dirty="0"/>
           </a:p>
@@ -6070,7 +6070,7 @@
           <a:p>
             <a:fld id="{173DEA02-80BC-4B4A-88AA-63BCC9943E88}" type="datetime3">
               <a:rPr lang="en-US" smtClean="0"/>
-              <a:t>25 August 2023</a:t>
+              <a:t>30 August 2023</a:t>
             </a:fld>
             <a:endParaRPr lang="en-GB" dirty="0"/>
           </a:p>
@@ -7055,7 +7055,7 @@
           <a:p>
             <a:fld id="{173DEA02-80BC-4B4A-88AA-63BCC9943E88}" type="datetime3">
               <a:rPr lang="en-US" smtClean="0"/>
-              <a:t>25 August 2023</a:t>
+              <a:t>30 August 2023</a:t>
             </a:fld>
             <a:endParaRPr lang="en-GB" dirty="0"/>
           </a:p>
@@ -7769,6 +7769,367 @@
 </file>
 
 <file path=ppt/slideLayouts/slideLayout22.xml><?xml version="1.0" encoding="utf-8"?>
+<p:sldLayout xmlns:a="http://schemas.openxmlformats.org/drawingml/2006/main" xmlns:r="http://schemas.openxmlformats.org/officeDocument/2006/relationships" xmlns:p="http://schemas.openxmlformats.org/presentationml/2006/main" preserve="1" userDrawn="1">
+  <p:cSld name="1_3 COLUMN TEXT SLIDE">
+    <p:bg>
+      <p:bgPr>
+        <a:solidFill>
+          <a:schemeClr val="bg1"/>
+        </a:solidFill>
+        <a:effectLst/>
+      </p:bgPr>
+    </p:bg>
+    <p:spTree>
+      <p:nvGrpSpPr>
+        <p:cNvPr id="1" name=""/>
+        <p:cNvGrpSpPr/>
+        <p:nvPr/>
+      </p:nvGrpSpPr>
+      <p:grpSpPr>
+        <a:xfrm>
+          <a:off x="0" y="0"/>
+          <a:ext cx="0" cy="0"/>
+          <a:chOff x="0" y="0"/>
+          <a:chExt cx="0" cy="0"/>
+        </a:xfrm>
+      </p:grpSpPr>
+      <p:sp>
+        <p:nvSpPr>
+          <p:cNvPr id="7" name="Slide Number Placeholder 25">
+            <a:extLst>
+              <a:ext uri="{FF2B5EF4-FFF2-40B4-BE49-F238E27FC236}">
+                <a16:creationId xmlns:a16="http://schemas.microsoft.com/office/drawing/2014/main" id="{93A9884C-110D-8D44-8CB3-7677ABC9541F}"/>
+              </a:ext>
+            </a:extLst>
+          </p:cNvPr>
+          <p:cNvSpPr txBox="1">
+            <a:spLocks/>
+          </p:cNvSpPr>
+          <p:nvPr/>
+        </p:nvSpPr>
+        <p:spPr>
+          <a:xfrm>
+            <a:off x="224132" y="6503745"/>
+            <a:ext cx="398073" cy="174101"/>
+          </a:xfrm>
+          <a:prstGeom prst="rect">
+            <a:avLst/>
+          </a:prstGeom>
+        </p:spPr>
+        <p:txBody>
+          <a:bodyPr vert="horz" lIns="0" tIns="0" rIns="0" bIns="0" rtlCol="0" anchor="ctr"/>
+          <a:lstStyle>
+            <a:defPPr>
+              <a:defRPr lang="en-US"/>
+            </a:defPPr>
+            <a:lvl1pPr marL="0" algn="l" defTabSz="914400" rtl="0" eaLnBrk="1" latinLnBrk="0" hangingPunct="1">
+              <a:defRPr sz="900" kern="1200">
+                <a:solidFill>
+                  <a:schemeClr val="tx1"/>
+                </a:solidFill>
+                <a:latin typeface="+mn-lt"/>
+                <a:ea typeface="+mn-ea"/>
+                <a:cs typeface="+mn-cs"/>
+              </a:defRPr>
+            </a:lvl1pPr>
+            <a:lvl2pPr marL="457200" algn="l" defTabSz="914400" rtl="0" eaLnBrk="1" latinLnBrk="0" hangingPunct="1">
+              <a:defRPr sz="1800" kern="1200">
+                <a:solidFill>
+                  <a:schemeClr val="tx1"/>
+                </a:solidFill>
+                <a:latin typeface="+mn-lt"/>
+                <a:ea typeface="+mn-ea"/>
+                <a:cs typeface="+mn-cs"/>
+              </a:defRPr>
+            </a:lvl2pPr>
+            <a:lvl3pPr marL="914400" algn="l" defTabSz="914400" rtl="0" eaLnBrk="1" latinLnBrk="0" hangingPunct="1">
+              <a:defRPr sz="1800" kern="1200">
+                <a:solidFill>
+                  <a:schemeClr val="tx1"/>
+                </a:solidFill>
+                <a:latin typeface="+mn-lt"/>
+                <a:ea typeface="+mn-ea"/>
+                <a:cs typeface="+mn-cs"/>
+              </a:defRPr>
+            </a:lvl3pPr>
+            <a:lvl4pPr marL="1371600" algn="l" defTabSz="914400" rtl="0" eaLnBrk="1" latinLnBrk="0" hangingPunct="1">
+              <a:defRPr sz="1800" kern="1200">
+                <a:solidFill>
+                  <a:schemeClr val="tx1"/>
+                </a:solidFill>
+                <a:latin typeface="+mn-lt"/>
+                <a:ea typeface="+mn-ea"/>
+                <a:cs typeface="+mn-cs"/>
+              </a:defRPr>
+            </a:lvl4pPr>
+            <a:lvl5pPr marL="1828800" algn="l" defTabSz="914400" rtl="0" eaLnBrk="1" latinLnBrk="0" hangingPunct="1">
+              <a:defRPr sz="1800" kern="1200">
+                <a:solidFill>
+                  <a:schemeClr val="tx1"/>
+                </a:solidFill>
+                <a:latin typeface="+mn-lt"/>
+                <a:ea typeface="+mn-ea"/>
+                <a:cs typeface="+mn-cs"/>
+              </a:defRPr>
+            </a:lvl5pPr>
+            <a:lvl6pPr marL="2286000" algn="l" defTabSz="914400" rtl="0" eaLnBrk="1" latinLnBrk="0" hangingPunct="1">
+              <a:defRPr sz="1800" kern="1200">
+                <a:solidFill>
+                  <a:schemeClr val="tx1"/>
+                </a:solidFill>
+                <a:latin typeface="+mn-lt"/>
+                <a:ea typeface="+mn-ea"/>
+                <a:cs typeface="+mn-cs"/>
+              </a:defRPr>
+            </a:lvl6pPr>
+            <a:lvl7pPr marL="2743200" algn="l" defTabSz="914400" rtl="0" eaLnBrk="1" latinLnBrk="0" hangingPunct="1">
+              <a:defRPr sz="1800" kern="1200">
+                <a:solidFill>
+                  <a:schemeClr val="tx1"/>
+                </a:solidFill>
+                <a:latin typeface="+mn-lt"/>
+                <a:ea typeface="+mn-ea"/>
+                <a:cs typeface="+mn-cs"/>
+              </a:defRPr>
+            </a:lvl7pPr>
+            <a:lvl8pPr marL="3200400" algn="l" defTabSz="914400" rtl="0" eaLnBrk="1" latinLnBrk="0" hangingPunct="1">
+              <a:defRPr sz="1800" kern="1200">
+                <a:solidFill>
+                  <a:schemeClr val="tx1"/>
+                </a:solidFill>
+                <a:latin typeface="+mn-lt"/>
+                <a:ea typeface="+mn-ea"/>
+                <a:cs typeface="+mn-cs"/>
+              </a:defRPr>
+            </a:lvl8pPr>
+            <a:lvl9pPr marL="3657600" algn="l" defTabSz="914400" rtl="0" eaLnBrk="1" latinLnBrk="0" hangingPunct="1">
+              <a:defRPr sz="1800" kern="1200">
+                <a:solidFill>
+                  <a:schemeClr val="tx1"/>
+                </a:solidFill>
+                <a:latin typeface="+mn-lt"/>
+                <a:ea typeface="+mn-ea"/>
+                <a:cs typeface="+mn-cs"/>
+              </a:defRPr>
+            </a:lvl9pPr>
+          </a:lstStyle>
+          <a:p>
+            <a:fld id="{0EAB5F6E-7727-EE48-B3FA-610FF2ED1CDA}" type="slidenum">
+              <a:rPr lang="en-GB" smtClean="0">
+                <a:solidFill>
+                  <a:schemeClr val="tx1"/>
+                </a:solidFill>
+              </a:rPr>
+              <a:pPr/>
+              <a:t>‹#›</a:t>
+            </a:fld>
+            <a:endParaRPr lang="en-GB" dirty="0">
+              <a:solidFill>
+                <a:schemeClr val="tx1"/>
+              </a:solidFill>
+            </a:endParaRPr>
+          </a:p>
+        </p:txBody>
+      </p:sp>
+      <p:sp>
+        <p:nvSpPr>
+          <p:cNvPr id="15" name="Text Placeholder 58">
+            <a:extLst>
+              <a:ext uri="{FF2B5EF4-FFF2-40B4-BE49-F238E27FC236}">
+                <a16:creationId xmlns:a16="http://schemas.microsoft.com/office/drawing/2014/main" id="{2EDE9BD7-1AD2-9841-98A3-F74D8FA2F013}"/>
+              </a:ext>
+            </a:extLst>
+          </p:cNvPr>
+          <p:cNvSpPr>
+            <a:spLocks noGrp="1"/>
+          </p:cNvSpPr>
+          <p:nvPr>
+            <p:ph type="body" sz="quarter" idx="27" hasCustomPrompt="1"/>
+          </p:nvPr>
+        </p:nvSpPr>
+        <p:spPr>
+          <a:xfrm>
+            <a:off x="223200" y="809177"/>
+            <a:ext cx="4898400" cy="313650"/>
+          </a:xfrm>
+        </p:spPr>
+        <p:txBody>
+          <a:bodyPr/>
+          <a:lstStyle>
+            <a:lvl1pPr>
+              <a:lnSpc>
+                <a:spcPts val="2850"/>
+              </a:lnSpc>
+              <a:spcBef>
+                <a:spcPts val="0"/>
+              </a:spcBef>
+              <a:defRPr sz="2800" cap="all" baseline="0">
+                <a:latin typeface="Impact" panose="020B0806030902050204" pitchFamily="34" charset="0"/>
+              </a:defRPr>
+            </a:lvl1pPr>
+          </a:lstStyle>
+          <a:p>
+            <a:pPr lvl="0"/>
+            <a:r>
+              <a:rPr lang="en-US" dirty="0"/>
+              <a:t>Subtitle</a:t>
+            </a:r>
+            <a:endParaRPr lang="en-GB" dirty="0"/>
+          </a:p>
+        </p:txBody>
+      </p:sp>
+      <p:sp>
+        <p:nvSpPr>
+          <p:cNvPr id="43" name="Text Placeholder 58">
+            <a:extLst>
+              <a:ext uri="{FF2B5EF4-FFF2-40B4-BE49-F238E27FC236}">
+                <a16:creationId xmlns:a16="http://schemas.microsoft.com/office/drawing/2014/main" id="{5FA72DD8-B99E-A745-BF03-9365086E8DD8}"/>
+              </a:ext>
+            </a:extLst>
+          </p:cNvPr>
+          <p:cNvSpPr>
+            <a:spLocks noGrp="1"/>
+          </p:cNvSpPr>
+          <p:nvPr>
+            <p:ph type="body" sz="quarter" idx="29" hasCustomPrompt="1"/>
+          </p:nvPr>
+        </p:nvSpPr>
+        <p:spPr>
+          <a:xfrm>
+            <a:off x="5335200" y="809177"/>
+            <a:ext cx="3210000" cy="313650"/>
+          </a:xfrm>
+        </p:spPr>
+        <p:txBody>
+          <a:bodyPr/>
+          <a:lstStyle>
+            <a:lvl1pPr>
+              <a:lnSpc>
+                <a:spcPts val="2850"/>
+              </a:lnSpc>
+              <a:spcBef>
+                <a:spcPts val="0"/>
+              </a:spcBef>
+              <a:defRPr sz="2800" cap="all" baseline="0">
+                <a:latin typeface="Impact" panose="020B0806030902050204" pitchFamily="34" charset="0"/>
+              </a:defRPr>
+            </a:lvl1pPr>
+          </a:lstStyle>
+          <a:p>
+            <a:pPr lvl="0"/>
+            <a:r>
+              <a:rPr lang="en-US" dirty="0"/>
+              <a:t>Subtitle</a:t>
+            </a:r>
+            <a:endParaRPr lang="en-GB" dirty="0"/>
+          </a:p>
+        </p:txBody>
+      </p:sp>
+      <p:sp>
+        <p:nvSpPr>
+          <p:cNvPr id="49" name="Text Placeholder 58">
+            <a:extLst>
+              <a:ext uri="{FF2B5EF4-FFF2-40B4-BE49-F238E27FC236}">
+                <a16:creationId xmlns:a16="http://schemas.microsoft.com/office/drawing/2014/main" id="{BB11FB6A-B0FD-754E-B1CA-4572D1A409C0}"/>
+              </a:ext>
+            </a:extLst>
+          </p:cNvPr>
+          <p:cNvSpPr>
+            <a:spLocks noGrp="1"/>
+          </p:cNvSpPr>
+          <p:nvPr>
+            <p:ph type="body" sz="quarter" idx="31" hasCustomPrompt="1"/>
+          </p:nvPr>
+        </p:nvSpPr>
+        <p:spPr>
+          <a:xfrm>
+            <a:off x="8758800" y="809177"/>
+            <a:ext cx="3210000" cy="313650"/>
+          </a:xfrm>
+        </p:spPr>
+        <p:txBody>
+          <a:bodyPr/>
+          <a:lstStyle>
+            <a:lvl1pPr>
+              <a:lnSpc>
+                <a:spcPts val="2850"/>
+              </a:lnSpc>
+              <a:spcBef>
+                <a:spcPts val="0"/>
+              </a:spcBef>
+              <a:defRPr sz="2800" cap="all" baseline="0">
+                <a:latin typeface="Impact" panose="020B0806030902050204" pitchFamily="34" charset="0"/>
+              </a:defRPr>
+            </a:lvl1pPr>
+          </a:lstStyle>
+          <a:p>
+            <a:pPr lvl="0"/>
+            <a:r>
+              <a:rPr lang="en-US" dirty="0"/>
+              <a:t>Subtitle</a:t>
+            </a:r>
+            <a:endParaRPr lang="en-GB" dirty="0"/>
+          </a:p>
+        </p:txBody>
+      </p:sp>
+      <p:sp>
+        <p:nvSpPr>
+          <p:cNvPr id="2" name="Title 4">
+            <a:extLst>
+              <a:ext uri="{FF2B5EF4-FFF2-40B4-BE49-F238E27FC236}">
+                <a16:creationId xmlns:a16="http://schemas.microsoft.com/office/drawing/2014/main" id="{28CEAEF8-64B6-59E0-9DCB-3D773D5A005A}"/>
+              </a:ext>
+            </a:extLst>
+          </p:cNvPr>
+          <p:cNvSpPr>
+            <a:spLocks noGrp="1"/>
+          </p:cNvSpPr>
+          <p:nvPr>
+            <p:ph type="title" hasCustomPrompt="1"/>
+          </p:nvPr>
+        </p:nvSpPr>
+        <p:spPr>
+          <a:xfrm>
+            <a:off x="222578" y="216747"/>
+            <a:ext cx="11736060" cy="495430"/>
+          </a:xfrm>
+        </p:spPr>
+        <p:txBody>
+          <a:bodyPr/>
+          <a:lstStyle>
+            <a:lvl1pPr>
+              <a:lnSpc>
+                <a:spcPts val="3900"/>
+              </a:lnSpc>
+              <a:defRPr sz="3800">
+                <a:solidFill>
+                  <a:schemeClr val="tx1"/>
+                </a:solidFill>
+              </a:defRPr>
+            </a:lvl1pPr>
+          </a:lstStyle>
+          <a:p>
+            <a:r>
+              <a:rPr lang="en-GB" noProof="0" dirty="0"/>
+              <a:t>Page title </a:t>
+            </a:r>
+          </a:p>
+        </p:txBody>
+      </p:sp>
+    </p:spTree>
+    <p:extLst>
+      <p:ext uri="{BB962C8B-B14F-4D97-AF65-F5344CB8AC3E}">
+        <p14:creationId xmlns:p14="http://schemas.microsoft.com/office/powerpoint/2010/main" val="334984900"/>
+      </p:ext>
+    </p:extLst>
+  </p:cSld>
+  <p:clrMapOvr>
+    <a:masterClrMapping/>
+  </p:clrMapOvr>
+</p:sldLayout>
+</file>
+
+<file path=ppt/slideLayouts/slideLayout23.xml><?xml version="1.0" encoding="utf-8"?>
 <p:sldLayout xmlns:a="http://schemas.openxmlformats.org/drawingml/2006/main" xmlns:r="http://schemas.openxmlformats.org/officeDocument/2006/relationships" xmlns:p="http://schemas.openxmlformats.org/presentationml/2006/main" preserve="1">
   <p:cSld name="1_2 COLUMN TEXT SLIDE">
     <p:bg>
@@ -8972,2214 +9333,6 @@
     <p:extLst>
       <p:ext uri="{BB962C8B-B14F-4D97-AF65-F5344CB8AC3E}">
         <p14:creationId xmlns:p14="http://schemas.microsoft.com/office/powerpoint/2010/main" val="3607220696"/>
-      </p:ext>
-    </p:extLst>
-  </p:cSld>
-  <p:clrMapOvr>
-    <a:masterClrMapping/>
-  </p:clrMapOvr>
-</p:sldLayout>
-</file>
-
-<file path=ppt/slideLayouts/slideLayout23.xml><?xml version="1.0" encoding="utf-8"?>
-<p:sldLayout xmlns:a="http://schemas.openxmlformats.org/drawingml/2006/main" xmlns:r="http://schemas.openxmlformats.org/officeDocument/2006/relationships" xmlns:p="http://schemas.openxmlformats.org/presentationml/2006/main" preserve="1">
-  <p:cSld name="1_3 COLUMN TEXT SLIDE">
-    <p:bg>
-      <p:bgPr>
-        <a:solidFill>
-          <a:schemeClr val="bg1"/>
-        </a:solidFill>
-        <a:effectLst/>
-      </p:bgPr>
-    </p:bg>
-    <p:spTree>
-      <p:nvGrpSpPr>
-        <p:cNvPr id="1" name=""/>
-        <p:cNvGrpSpPr/>
-        <p:nvPr/>
-      </p:nvGrpSpPr>
-      <p:grpSpPr>
-        <a:xfrm>
-          <a:off x="0" y="0"/>
-          <a:ext cx="0" cy="0"/>
-          <a:chOff x="0" y="0"/>
-          <a:chExt cx="0" cy="0"/>
-        </a:xfrm>
-      </p:grpSpPr>
-      <p:sp>
-        <p:nvSpPr>
-          <p:cNvPr id="7" name="Slide Number Placeholder 25">
-            <a:extLst>
-              <a:ext uri="{FF2B5EF4-FFF2-40B4-BE49-F238E27FC236}">
-                <a16:creationId xmlns:a16="http://schemas.microsoft.com/office/drawing/2014/main" id="{93A9884C-110D-8D44-8CB3-7677ABC9541F}"/>
-              </a:ext>
-            </a:extLst>
-          </p:cNvPr>
-          <p:cNvSpPr txBox="1">
-            <a:spLocks/>
-          </p:cNvSpPr>
-          <p:nvPr/>
-        </p:nvSpPr>
-        <p:spPr>
-          <a:xfrm>
-            <a:off x="224132" y="6503745"/>
-            <a:ext cx="398073" cy="174101"/>
-          </a:xfrm>
-          <a:prstGeom prst="rect">
-            <a:avLst/>
-          </a:prstGeom>
-        </p:spPr>
-        <p:txBody>
-          <a:bodyPr vert="horz" lIns="0" tIns="0" rIns="0" bIns="0" rtlCol="0" anchor="ctr"/>
-          <a:lstStyle>
-            <a:defPPr>
-              <a:defRPr lang="en-US"/>
-            </a:defPPr>
-            <a:lvl1pPr marL="0" algn="l" defTabSz="914400" rtl="0" eaLnBrk="1" latinLnBrk="0" hangingPunct="1">
-              <a:defRPr sz="900" kern="1200">
-                <a:solidFill>
-                  <a:schemeClr val="tx1"/>
-                </a:solidFill>
-                <a:latin typeface="+mn-lt"/>
-                <a:ea typeface="+mn-ea"/>
-                <a:cs typeface="+mn-cs"/>
-              </a:defRPr>
-            </a:lvl1pPr>
-            <a:lvl2pPr marL="457200" algn="l" defTabSz="914400" rtl="0" eaLnBrk="1" latinLnBrk="0" hangingPunct="1">
-              <a:defRPr sz="1800" kern="1200">
-                <a:solidFill>
-                  <a:schemeClr val="tx1"/>
-                </a:solidFill>
-                <a:latin typeface="+mn-lt"/>
-                <a:ea typeface="+mn-ea"/>
-                <a:cs typeface="+mn-cs"/>
-              </a:defRPr>
-            </a:lvl2pPr>
-            <a:lvl3pPr marL="914400" algn="l" defTabSz="914400" rtl="0" eaLnBrk="1" latinLnBrk="0" hangingPunct="1">
-              <a:defRPr sz="1800" kern="1200">
-                <a:solidFill>
-                  <a:schemeClr val="tx1"/>
-                </a:solidFill>
-                <a:latin typeface="+mn-lt"/>
-                <a:ea typeface="+mn-ea"/>
-                <a:cs typeface="+mn-cs"/>
-              </a:defRPr>
-            </a:lvl3pPr>
-            <a:lvl4pPr marL="1371600" algn="l" defTabSz="914400" rtl="0" eaLnBrk="1" latinLnBrk="0" hangingPunct="1">
-              <a:defRPr sz="1800" kern="1200">
-                <a:solidFill>
-                  <a:schemeClr val="tx1"/>
-                </a:solidFill>
-                <a:latin typeface="+mn-lt"/>
-                <a:ea typeface="+mn-ea"/>
-                <a:cs typeface="+mn-cs"/>
-              </a:defRPr>
-            </a:lvl4pPr>
-            <a:lvl5pPr marL="1828800" algn="l" defTabSz="914400" rtl="0" eaLnBrk="1" latinLnBrk="0" hangingPunct="1">
-              <a:defRPr sz="1800" kern="1200">
-                <a:solidFill>
-                  <a:schemeClr val="tx1"/>
-                </a:solidFill>
-                <a:latin typeface="+mn-lt"/>
-                <a:ea typeface="+mn-ea"/>
-                <a:cs typeface="+mn-cs"/>
-              </a:defRPr>
-            </a:lvl5pPr>
-            <a:lvl6pPr marL="2286000" algn="l" defTabSz="914400" rtl="0" eaLnBrk="1" latinLnBrk="0" hangingPunct="1">
-              <a:defRPr sz="1800" kern="1200">
-                <a:solidFill>
-                  <a:schemeClr val="tx1"/>
-                </a:solidFill>
-                <a:latin typeface="+mn-lt"/>
-                <a:ea typeface="+mn-ea"/>
-                <a:cs typeface="+mn-cs"/>
-              </a:defRPr>
-            </a:lvl6pPr>
-            <a:lvl7pPr marL="2743200" algn="l" defTabSz="914400" rtl="0" eaLnBrk="1" latinLnBrk="0" hangingPunct="1">
-              <a:defRPr sz="1800" kern="1200">
-                <a:solidFill>
-                  <a:schemeClr val="tx1"/>
-                </a:solidFill>
-                <a:latin typeface="+mn-lt"/>
-                <a:ea typeface="+mn-ea"/>
-                <a:cs typeface="+mn-cs"/>
-              </a:defRPr>
-            </a:lvl7pPr>
-            <a:lvl8pPr marL="3200400" algn="l" defTabSz="914400" rtl="0" eaLnBrk="1" latinLnBrk="0" hangingPunct="1">
-              <a:defRPr sz="1800" kern="1200">
-                <a:solidFill>
-                  <a:schemeClr val="tx1"/>
-                </a:solidFill>
-                <a:latin typeface="+mn-lt"/>
-                <a:ea typeface="+mn-ea"/>
-                <a:cs typeface="+mn-cs"/>
-              </a:defRPr>
-            </a:lvl8pPr>
-            <a:lvl9pPr marL="3657600" algn="l" defTabSz="914400" rtl="0" eaLnBrk="1" latinLnBrk="0" hangingPunct="1">
-              <a:defRPr sz="1800" kern="1200">
-                <a:solidFill>
-                  <a:schemeClr val="tx1"/>
-                </a:solidFill>
-                <a:latin typeface="+mn-lt"/>
-                <a:ea typeface="+mn-ea"/>
-                <a:cs typeface="+mn-cs"/>
-              </a:defRPr>
-            </a:lvl9pPr>
-          </a:lstStyle>
-          <a:p>
-            <a:fld id="{0EAB5F6E-7727-EE48-B3FA-610FF2ED1CDA}" type="slidenum">
-              <a:rPr lang="en-GB" smtClean="0">
-                <a:solidFill>
-                  <a:schemeClr val="tx1"/>
-                </a:solidFill>
-              </a:rPr>
-              <a:pPr/>
-              <a:t>‹#›</a:t>
-            </a:fld>
-            <a:endParaRPr lang="en-GB" dirty="0">
-              <a:solidFill>
-                <a:schemeClr val="tx1"/>
-              </a:solidFill>
-            </a:endParaRPr>
-          </a:p>
-        </p:txBody>
-      </p:sp>
-      <p:sp>
-        <p:nvSpPr>
-          <p:cNvPr id="12" name="Content Placeholder 2">
-            <a:extLst>
-              <a:ext uri="{FF2B5EF4-FFF2-40B4-BE49-F238E27FC236}">
-                <a16:creationId xmlns:a16="http://schemas.microsoft.com/office/drawing/2014/main" id="{7016DF50-3718-7544-9EE3-82D7B58CF079}"/>
-              </a:ext>
-            </a:extLst>
-          </p:cNvPr>
-          <p:cNvSpPr>
-            <a:spLocks noGrp="1"/>
-          </p:cNvSpPr>
-          <p:nvPr>
-            <p:ph sz="quarter" idx="24" hasCustomPrompt="1"/>
-          </p:nvPr>
-        </p:nvSpPr>
-        <p:spPr>
-          <a:xfrm>
-            <a:off x="223200" y="2120400"/>
-            <a:ext cx="3720150" cy="3860502"/>
-          </a:xfrm>
-        </p:spPr>
-        <p:txBody>
-          <a:bodyPr anchor="t"/>
-          <a:lstStyle>
-            <a:lvl1pPr marL="0" marR="0" indent="0" algn="l" defTabSz="914400" rtl="0" eaLnBrk="1" fontAlgn="auto" latinLnBrk="0" hangingPunct="1">
-              <a:lnSpc>
-                <a:spcPts val="1850"/>
-              </a:lnSpc>
-              <a:spcBef>
-                <a:spcPts val="0"/>
-              </a:spcBef>
-              <a:spcAft>
-                <a:spcPts val="400"/>
-              </a:spcAft>
-              <a:buClr>
-                <a:schemeClr val="tx2"/>
-              </a:buClr>
-              <a:buSzTx/>
-              <a:buFont typeface="Arial" panose="020B0604020202020204" pitchFamily="34" charset="0"/>
-              <a:buNone/>
-              <a:tabLst/>
-              <a:defRPr/>
-            </a:lvl1pPr>
-          </a:lstStyle>
-          <a:p>
-            <a:pPr marL="0" marR="0" lvl="0" indent="0" algn="l" defTabSz="914400" rtl="0" eaLnBrk="1" fontAlgn="auto" latinLnBrk="0" hangingPunct="1">
-              <a:lnSpc>
-                <a:spcPts val="1850"/>
-              </a:lnSpc>
-              <a:spcBef>
-                <a:spcPts val="0"/>
-              </a:spcBef>
-              <a:spcAft>
-                <a:spcPts val="400"/>
-              </a:spcAft>
-              <a:buClr>
-                <a:schemeClr val="tx2"/>
-              </a:buClr>
-              <a:buSzTx/>
-              <a:buFont typeface="Arial" panose="020B0604020202020204" pitchFamily="34" charset="0"/>
-              <a:buNone/>
-              <a:tabLst/>
-              <a:defRPr/>
-            </a:pPr>
-            <a:r>
-              <a:rPr lang="en-GB" noProof="0" dirty="0" err="1"/>
-              <a:t>Nime</a:t>
-            </a:r>
-            <a:r>
-              <a:rPr lang="en-GB" noProof="0" dirty="0"/>
-              <a:t> </a:t>
-            </a:r>
-            <a:r>
-              <a:rPr lang="en-GB" noProof="0" dirty="0" err="1"/>
-              <a:t>por</a:t>
-            </a:r>
-            <a:r>
-              <a:rPr lang="en-GB" noProof="0" dirty="0"/>
-              <a:t> sum que </a:t>
-            </a:r>
-            <a:r>
-              <a:rPr lang="en-GB" noProof="0" dirty="0" err="1"/>
-              <a:t>nonecabo</a:t>
-            </a:r>
-            <a:r>
-              <a:rPr lang="en-GB" noProof="0" dirty="0"/>
-              <a:t>. </a:t>
-            </a:r>
-            <a:r>
-              <a:rPr lang="en-GB" noProof="0" dirty="0" err="1"/>
-              <a:t>Gitis</a:t>
-            </a:r>
-            <a:r>
-              <a:rPr lang="en-GB" noProof="0" dirty="0"/>
-              <a:t> ex </a:t>
-            </a:r>
-            <a:r>
-              <a:rPr lang="en-GB" noProof="0" dirty="0" err="1"/>
-              <a:t>quistius</a:t>
-            </a:r>
-            <a:r>
-              <a:rPr lang="en-GB" noProof="0" dirty="0"/>
-              <a:t> </a:t>
-            </a:r>
-            <a:r>
-              <a:rPr lang="en-GB" noProof="0" dirty="0" err="1"/>
-              <a:t>reptatibusae</a:t>
-            </a:r>
-            <a:r>
-              <a:rPr lang="en-GB" noProof="0" dirty="0"/>
-              <a:t> pa </a:t>
-            </a:r>
-            <a:r>
-              <a:rPr lang="en-GB" noProof="0" dirty="0" err="1"/>
-              <a:t>pellent</a:t>
-            </a:r>
-            <a:r>
-              <a:rPr lang="en-GB" noProof="0" dirty="0"/>
-              <a:t> et </a:t>
-            </a:r>
-            <a:r>
-              <a:rPr lang="en-GB" noProof="0" dirty="0" err="1"/>
-              <a:t>illud</a:t>
-            </a:r>
-            <a:r>
-              <a:rPr lang="en-GB" noProof="0" dirty="0"/>
-              <a:t> </a:t>
-            </a:r>
-            <a:r>
-              <a:rPr lang="en-GB" noProof="0" dirty="0" err="1"/>
-              <a:t>eumqui</a:t>
-            </a:r>
-            <a:r>
-              <a:rPr lang="en-GB" noProof="0" dirty="0"/>
-              <a:t> </a:t>
-            </a:r>
-            <a:r>
-              <a:rPr lang="en-GB" noProof="0" dirty="0" err="1"/>
-              <a:t>dolupta</a:t>
-            </a:r>
-            <a:r>
-              <a:rPr lang="en-GB" noProof="0" dirty="0"/>
-              <a:t> </a:t>
-            </a:r>
-            <a:r>
-              <a:rPr lang="en-GB" noProof="0" dirty="0" err="1"/>
-              <a:t>volupta</a:t>
-            </a:r>
-            <a:r>
-              <a:rPr lang="en-GB" noProof="0" dirty="0"/>
-              <a:t> </a:t>
-            </a:r>
-            <a:r>
-              <a:rPr lang="en-GB" noProof="0" dirty="0" err="1"/>
-              <a:t>consedis</a:t>
-            </a:r>
-            <a:r>
-              <a:rPr lang="en-GB" noProof="0" dirty="0"/>
-              <a:t> </a:t>
-            </a:r>
-            <a:r>
-              <a:rPr lang="en-GB" noProof="0" dirty="0" err="1"/>
-              <a:t>ipiet</a:t>
-            </a:r>
-            <a:r>
-              <a:rPr lang="en-GB" noProof="0" dirty="0"/>
-              <a:t> </a:t>
-            </a:r>
-            <a:r>
-              <a:rPr lang="en-GB" noProof="0" dirty="0" err="1"/>
-              <a:t>accusam</a:t>
-            </a:r>
-            <a:r>
-              <a:rPr lang="en-GB" noProof="0" dirty="0"/>
-              <a:t> </a:t>
-            </a:r>
-            <a:r>
-              <a:rPr lang="en-GB" noProof="0" dirty="0" err="1"/>
-              <a:t>dolorias</a:t>
-            </a:r>
-            <a:r>
-              <a:rPr lang="en-GB" noProof="0" dirty="0"/>
-              <a:t> </a:t>
-            </a:r>
-            <a:r>
-              <a:rPr lang="en-GB" noProof="0" dirty="0" err="1"/>
-              <a:t>aut</a:t>
-            </a:r>
-            <a:r>
-              <a:rPr lang="en-GB" noProof="0" dirty="0"/>
-              <a:t> et </a:t>
-            </a:r>
-            <a:r>
-              <a:rPr lang="en-GB" noProof="0" dirty="0" err="1"/>
-              <a:t>estiber</a:t>
-            </a:r>
-            <a:r>
-              <a:rPr lang="en-GB" noProof="0" dirty="0"/>
-              <a:t> </a:t>
-            </a:r>
-            <a:r>
-              <a:rPr lang="en-GB" noProof="0" dirty="0" err="1"/>
-              <a:t>dixitius</a:t>
-            </a:r>
-            <a:r>
-              <a:rPr lang="en-GB" noProof="0" dirty="0"/>
-              <a:t> </a:t>
-            </a:r>
-            <a:r>
-              <a:rPr lang="en-GB" noProof="0" dirty="0" err="1"/>
-              <a:t>orporem</a:t>
-            </a:r>
-            <a:r>
-              <a:rPr lang="en-GB" noProof="0" dirty="0"/>
-              <a:t> </a:t>
-            </a:r>
-            <a:r>
-              <a:rPr lang="en-GB" noProof="0" dirty="0" err="1"/>
-              <a:t>olorita</a:t>
-            </a:r>
-            <a:r>
-              <a:rPr lang="en-GB" noProof="0" dirty="0"/>
-              <a:t> </a:t>
-            </a:r>
-            <a:r>
-              <a:rPr lang="en-GB" noProof="0" dirty="0" err="1"/>
-              <a:t>sperferum</a:t>
-            </a:r>
-            <a:r>
-              <a:rPr lang="en-GB" noProof="0" dirty="0"/>
-              <a:t> </a:t>
-            </a:r>
-            <a:r>
-              <a:rPr lang="en-GB" noProof="0" dirty="0" err="1"/>
-              <a:t>rectamet</a:t>
-            </a:r>
-            <a:r>
-              <a:rPr lang="en-GB" noProof="0" dirty="0"/>
-              <a:t> se </a:t>
-            </a:r>
-            <a:r>
-              <a:rPr lang="en-GB" noProof="0" dirty="0" err="1"/>
-              <a:t>explaciis</a:t>
-            </a:r>
-            <a:r>
-              <a:rPr lang="en-GB" noProof="0" dirty="0"/>
-              <a:t> </a:t>
-            </a:r>
-            <a:r>
-              <a:rPr lang="en-GB" noProof="0" dirty="0" err="1"/>
-              <a:t>est</a:t>
-            </a:r>
-            <a:r>
-              <a:rPr lang="en-GB" noProof="0" dirty="0"/>
-              <a:t> </a:t>
-            </a:r>
-            <a:r>
-              <a:rPr lang="en-GB" noProof="0" dirty="0" err="1"/>
-              <a:t>fuga</a:t>
-            </a:r>
-            <a:r>
-              <a:rPr lang="en-GB" noProof="0" dirty="0"/>
-              <a:t>. </a:t>
-            </a:r>
-            <a:r>
-              <a:rPr lang="en-GB" noProof="0" dirty="0" err="1"/>
-              <a:t>Pellent</a:t>
-            </a:r>
-            <a:r>
-              <a:rPr lang="en-GB" noProof="0" dirty="0"/>
-              <a:t> </a:t>
-            </a:r>
-            <a:r>
-              <a:rPr lang="en-GB" noProof="0" dirty="0" err="1"/>
-              <a:t>eumqubus</a:t>
-            </a:r>
-            <a:r>
-              <a:rPr lang="en-GB" noProof="0" dirty="0"/>
-              <a:t> </a:t>
-            </a:r>
-            <a:r>
-              <a:rPr lang="en-GB" noProof="0" dirty="0" err="1"/>
-              <a:t>dolupta</a:t>
-            </a:r>
-            <a:r>
-              <a:rPr lang="en-GB" noProof="0" dirty="0"/>
-              <a:t> </a:t>
-            </a:r>
-            <a:r>
-              <a:rPr lang="en-GB" noProof="0" dirty="0" err="1"/>
-              <a:t>volupta</a:t>
-            </a:r>
-            <a:r>
-              <a:rPr lang="en-GB" noProof="0" dirty="0"/>
-              <a:t> </a:t>
-            </a:r>
-            <a:r>
-              <a:rPr lang="en-GB" noProof="0" dirty="0" err="1"/>
-              <a:t>consedis</a:t>
-            </a:r>
-            <a:r>
-              <a:rPr lang="en-GB" noProof="0" dirty="0"/>
-              <a:t> </a:t>
-            </a:r>
-            <a:r>
-              <a:rPr lang="en-GB" noProof="0" dirty="0" err="1"/>
-              <a:t>ipiet</a:t>
-            </a:r>
-            <a:r>
-              <a:rPr lang="en-GB" noProof="0" dirty="0"/>
-              <a:t> </a:t>
-            </a:r>
-            <a:r>
-              <a:rPr lang="en-GB" noProof="0" dirty="0" err="1"/>
-              <a:t>dixit</a:t>
-            </a:r>
-            <a:r>
-              <a:rPr lang="en-GB" noProof="0" dirty="0"/>
-              <a:t> et ex </a:t>
-            </a:r>
-            <a:r>
-              <a:rPr lang="en-GB" noProof="0" dirty="0" err="1"/>
-              <a:t>accusam</a:t>
-            </a:r>
-            <a:r>
-              <a:rPr lang="en-GB" noProof="0" dirty="0"/>
-              <a:t> </a:t>
-            </a:r>
-            <a:r>
-              <a:rPr lang="en-GB" noProof="0" dirty="0" err="1"/>
-              <a:t>dolaris</a:t>
-            </a:r>
-            <a:r>
-              <a:rPr lang="en-GB" noProof="0" dirty="0"/>
-              <a:t>. Lorem ipsum </a:t>
-            </a:r>
-            <a:r>
-              <a:rPr lang="en-GB" noProof="0" dirty="0" err="1"/>
-              <a:t>dolor</a:t>
-            </a:r>
-            <a:r>
-              <a:rPr lang="en-GB" noProof="0" dirty="0"/>
-              <a:t> sit </a:t>
-            </a:r>
-            <a:r>
-              <a:rPr lang="en-GB" noProof="0" dirty="0" err="1"/>
-              <a:t>amet</a:t>
-            </a:r>
-            <a:r>
-              <a:rPr lang="en-GB" noProof="0" dirty="0"/>
-              <a:t> rana a folio </a:t>
-            </a:r>
-            <a:r>
-              <a:rPr lang="en-GB" noProof="0" dirty="0" err="1"/>
-              <a:t>dixit</a:t>
-            </a:r>
-            <a:r>
-              <a:rPr lang="en-GB" noProof="0" dirty="0"/>
-              <a:t> et magnus </a:t>
-            </a:r>
-            <a:r>
-              <a:rPr lang="en-GB" noProof="0" dirty="0" err="1"/>
-              <a:t>romana</a:t>
-            </a:r>
-            <a:r>
-              <a:rPr lang="en-GB" noProof="0" dirty="0"/>
-              <a:t> </a:t>
-            </a:r>
-            <a:r>
-              <a:rPr lang="en-GB" noProof="0" dirty="0" err="1"/>
-              <a:t>dias</a:t>
-            </a:r>
-            <a:r>
-              <a:rPr lang="en-GB" noProof="0" dirty="0"/>
-              <a:t> </a:t>
-            </a:r>
-            <a:r>
-              <a:rPr lang="en-GB" noProof="0" dirty="0" err="1"/>
-              <a:t>es</a:t>
-            </a:r>
-            <a:r>
-              <a:rPr lang="en-GB" noProof="0" dirty="0"/>
-              <a:t> </a:t>
-            </a:r>
-            <a:r>
-              <a:rPr lang="en-GB" noProof="0" dirty="0" err="1"/>
-              <a:t>regis</a:t>
-            </a:r>
-            <a:r>
-              <a:rPr lang="en-GB" noProof="0" dirty="0"/>
-              <a:t>. </a:t>
-            </a:r>
-            <a:r>
-              <a:rPr lang="en-GB" noProof="0" dirty="0" err="1"/>
-              <a:t>Daedulus</a:t>
-            </a:r>
-            <a:r>
-              <a:rPr lang="en-GB" noProof="0" dirty="0"/>
-              <a:t> fugit ex libris </a:t>
-            </a:r>
-            <a:r>
-              <a:rPr lang="en-GB" noProof="0" dirty="0" err="1"/>
-              <a:t>consedis</a:t>
-            </a:r>
-            <a:r>
-              <a:rPr lang="en-GB" noProof="0" dirty="0"/>
-              <a:t> </a:t>
-            </a:r>
-            <a:r>
-              <a:rPr lang="en-GB" noProof="0" dirty="0" err="1"/>
-              <a:t>ipiet</a:t>
-            </a:r>
-            <a:r>
-              <a:rPr lang="en-GB" noProof="0" dirty="0"/>
-              <a:t> </a:t>
-            </a:r>
-            <a:r>
-              <a:rPr lang="en-GB" noProof="0" dirty="0" err="1"/>
-              <a:t>accusam</a:t>
-            </a:r>
-            <a:r>
-              <a:rPr lang="en-GB" noProof="0" dirty="0"/>
-              <a:t>. </a:t>
-            </a:r>
-            <a:r>
-              <a:rPr lang="en-GB" noProof="0" dirty="0" err="1"/>
-              <a:t>Pellent</a:t>
-            </a:r>
-            <a:r>
-              <a:rPr lang="en-GB" noProof="0" dirty="0"/>
-              <a:t> </a:t>
-            </a:r>
-            <a:r>
-              <a:rPr lang="en-GB" noProof="0" dirty="0" err="1"/>
-              <a:t>folibus</a:t>
-            </a:r>
-            <a:r>
-              <a:rPr lang="en-GB" noProof="0" dirty="0"/>
-              <a:t> </a:t>
-            </a:r>
-            <a:r>
-              <a:rPr lang="en-GB" noProof="0" dirty="0" err="1"/>
-              <a:t>eumqubus</a:t>
-            </a:r>
-            <a:r>
-              <a:rPr lang="en-GB" noProof="0" dirty="0"/>
-              <a:t> </a:t>
-            </a:r>
-            <a:r>
-              <a:rPr lang="en-GB" noProof="0" dirty="0" err="1"/>
-              <a:t>dolupta</a:t>
-            </a:r>
-            <a:r>
-              <a:rPr lang="en-GB" noProof="0" dirty="0"/>
-              <a:t> </a:t>
-            </a:r>
-            <a:r>
-              <a:rPr lang="en-GB" noProof="0" dirty="0" err="1"/>
-              <a:t>volupta</a:t>
-            </a:r>
-            <a:r>
-              <a:rPr lang="en-GB" noProof="0" dirty="0"/>
-              <a:t> </a:t>
-            </a:r>
-            <a:r>
-              <a:rPr lang="en-GB" noProof="0" dirty="0" err="1"/>
-              <a:t>consedis</a:t>
-            </a:r>
-            <a:r>
-              <a:rPr lang="en-GB" noProof="0" dirty="0"/>
-              <a:t> </a:t>
-            </a:r>
-            <a:r>
-              <a:rPr lang="en-GB" noProof="0" dirty="0" err="1"/>
-              <a:t>ipiet</a:t>
-            </a:r>
-            <a:r>
-              <a:rPr lang="en-GB" noProof="0" dirty="0"/>
-              <a:t> </a:t>
-            </a:r>
-            <a:r>
-              <a:rPr lang="en-GB" noProof="0" dirty="0" err="1"/>
-              <a:t>dixit</a:t>
-            </a:r>
-            <a:r>
-              <a:rPr lang="en-GB" noProof="0" dirty="0"/>
-              <a:t> et </a:t>
-            </a:r>
-            <a:r>
-              <a:rPr lang="en-GB" noProof="0" dirty="0" err="1"/>
-              <a:t>accusam</a:t>
-            </a:r>
-            <a:r>
-              <a:rPr lang="en-GB" noProof="0" dirty="0"/>
-              <a:t> </a:t>
-            </a:r>
-            <a:r>
-              <a:rPr lang="en-GB" noProof="0" dirty="0" err="1"/>
-              <a:t>dolaris</a:t>
-            </a:r>
-            <a:r>
-              <a:rPr lang="en-GB" noProof="0" dirty="0"/>
-              <a:t>. Lorem ipsum </a:t>
-            </a:r>
-            <a:r>
-              <a:rPr lang="en-GB" noProof="0" dirty="0" err="1"/>
-              <a:t>dolor</a:t>
-            </a:r>
-            <a:r>
-              <a:rPr lang="en-GB" noProof="0" dirty="0"/>
-              <a:t> sit </a:t>
-            </a:r>
-            <a:r>
-              <a:rPr lang="en-GB" noProof="0" dirty="0" err="1"/>
-              <a:t>amet</a:t>
-            </a:r>
-            <a:r>
-              <a:rPr lang="en-GB" noProof="0" dirty="0"/>
-              <a:t> rana a folio </a:t>
-            </a:r>
-            <a:r>
-              <a:rPr lang="en-GB" noProof="0" dirty="0" err="1"/>
-              <a:t>dixit</a:t>
-            </a:r>
-            <a:r>
-              <a:rPr lang="en-GB" noProof="0" dirty="0"/>
-              <a:t> et magnus </a:t>
-            </a:r>
-            <a:r>
-              <a:rPr lang="en-GB" noProof="0" dirty="0" err="1"/>
-              <a:t>romana</a:t>
-            </a:r>
-            <a:r>
-              <a:rPr lang="en-GB" noProof="0" dirty="0"/>
-              <a:t> </a:t>
-            </a:r>
-            <a:r>
-              <a:rPr lang="en-GB" noProof="0" dirty="0" err="1"/>
-              <a:t>dias</a:t>
-            </a:r>
-            <a:r>
-              <a:rPr lang="en-GB" noProof="0" dirty="0"/>
-              <a:t> </a:t>
-            </a:r>
-            <a:r>
-              <a:rPr lang="en-GB" noProof="0" dirty="0" err="1"/>
-              <a:t>es</a:t>
-            </a:r>
-            <a:r>
-              <a:rPr lang="en-GB" noProof="0" dirty="0"/>
-              <a:t> </a:t>
-            </a:r>
-            <a:r>
-              <a:rPr lang="en-GB" noProof="0" dirty="0" err="1"/>
-              <a:t>regis</a:t>
-            </a:r>
-            <a:r>
-              <a:rPr lang="en-GB" noProof="0" dirty="0"/>
-              <a:t>. </a:t>
-            </a:r>
-            <a:r>
-              <a:rPr lang="en-GB" noProof="0" dirty="0" err="1"/>
-              <a:t>Daedulus</a:t>
-            </a:r>
-            <a:r>
-              <a:rPr lang="en-GB" noProof="0" dirty="0"/>
-              <a:t> fugit ex libris </a:t>
-            </a:r>
-            <a:r>
-              <a:rPr lang="en-GB" noProof="0" dirty="0" err="1"/>
-              <a:t>consedis</a:t>
-            </a:r>
-            <a:r>
-              <a:rPr lang="en-GB" noProof="0" dirty="0"/>
-              <a:t> </a:t>
-            </a:r>
-            <a:r>
-              <a:rPr lang="en-GB" noProof="0" dirty="0" err="1"/>
-              <a:t>ipiet</a:t>
-            </a:r>
-            <a:r>
-              <a:rPr lang="en-GB" noProof="0" dirty="0"/>
-              <a:t> </a:t>
-            </a:r>
-            <a:r>
-              <a:rPr lang="en-GB" noProof="0" dirty="0" err="1"/>
-              <a:t>accusam</a:t>
-            </a:r>
-            <a:r>
-              <a:rPr lang="en-GB" noProof="0" dirty="0"/>
-              <a:t>.</a:t>
-            </a:r>
-          </a:p>
-        </p:txBody>
-      </p:sp>
-      <p:sp>
-        <p:nvSpPr>
-          <p:cNvPr id="15" name="Text Placeholder 58">
-            <a:extLst>
-              <a:ext uri="{FF2B5EF4-FFF2-40B4-BE49-F238E27FC236}">
-                <a16:creationId xmlns:a16="http://schemas.microsoft.com/office/drawing/2014/main" id="{2EDE9BD7-1AD2-9841-98A3-F74D8FA2F013}"/>
-              </a:ext>
-            </a:extLst>
-          </p:cNvPr>
-          <p:cNvSpPr>
-            <a:spLocks noGrp="1"/>
-          </p:cNvSpPr>
-          <p:nvPr>
-            <p:ph type="body" sz="quarter" idx="27" hasCustomPrompt="1"/>
-          </p:nvPr>
-        </p:nvSpPr>
-        <p:spPr>
-          <a:xfrm>
-            <a:off x="223200" y="1706400"/>
-            <a:ext cx="3720150" cy="313650"/>
-          </a:xfrm>
-        </p:spPr>
-        <p:txBody>
-          <a:bodyPr/>
-          <a:lstStyle>
-            <a:lvl1pPr>
-              <a:lnSpc>
-                <a:spcPts val="2850"/>
-              </a:lnSpc>
-              <a:spcBef>
-                <a:spcPts val="0"/>
-              </a:spcBef>
-              <a:defRPr sz="2800" cap="all" baseline="0">
-                <a:latin typeface="Impact" panose="020B0806030902050204" pitchFamily="34" charset="0"/>
-              </a:defRPr>
-            </a:lvl1pPr>
-          </a:lstStyle>
-          <a:p>
-            <a:pPr lvl="0"/>
-            <a:r>
-              <a:rPr lang="en-US" dirty="0"/>
-              <a:t>Subtitle</a:t>
-            </a:r>
-            <a:endParaRPr lang="en-GB" dirty="0"/>
-          </a:p>
-        </p:txBody>
-      </p:sp>
-      <p:sp>
-        <p:nvSpPr>
-          <p:cNvPr id="42" name="Content Placeholder 2">
-            <a:extLst>
-              <a:ext uri="{FF2B5EF4-FFF2-40B4-BE49-F238E27FC236}">
-                <a16:creationId xmlns:a16="http://schemas.microsoft.com/office/drawing/2014/main" id="{730F7263-7E04-344F-9148-E3FD2C529B34}"/>
-              </a:ext>
-            </a:extLst>
-          </p:cNvPr>
-          <p:cNvSpPr>
-            <a:spLocks noGrp="1"/>
-          </p:cNvSpPr>
-          <p:nvPr>
-            <p:ph sz="quarter" idx="28" hasCustomPrompt="1"/>
-          </p:nvPr>
-        </p:nvSpPr>
-        <p:spPr>
-          <a:xfrm>
-            <a:off x="4186646" y="2120400"/>
-            <a:ext cx="3777300" cy="3860502"/>
-          </a:xfrm>
-        </p:spPr>
-        <p:txBody>
-          <a:bodyPr anchor="t"/>
-          <a:lstStyle>
-            <a:lvl1pPr marL="0" marR="0" indent="0" algn="l" defTabSz="914400" rtl="0" eaLnBrk="1" fontAlgn="auto" latinLnBrk="0" hangingPunct="1">
-              <a:lnSpc>
-                <a:spcPts val="1850"/>
-              </a:lnSpc>
-              <a:spcBef>
-                <a:spcPts val="0"/>
-              </a:spcBef>
-              <a:spcAft>
-                <a:spcPts val="400"/>
-              </a:spcAft>
-              <a:buClr>
-                <a:schemeClr val="tx2"/>
-              </a:buClr>
-              <a:buSzTx/>
-              <a:buFont typeface="Arial" panose="020B0604020202020204" pitchFamily="34" charset="0"/>
-              <a:buNone/>
-              <a:tabLst/>
-              <a:defRPr/>
-            </a:lvl1pPr>
-          </a:lstStyle>
-          <a:p>
-            <a:pPr marL="0" marR="0" lvl="0" indent="0" algn="l" defTabSz="914400" rtl="0" eaLnBrk="1" fontAlgn="auto" latinLnBrk="0" hangingPunct="1">
-              <a:lnSpc>
-                <a:spcPts val="1850"/>
-              </a:lnSpc>
-              <a:spcBef>
-                <a:spcPts val="0"/>
-              </a:spcBef>
-              <a:spcAft>
-                <a:spcPts val="400"/>
-              </a:spcAft>
-              <a:buClr>
-                <a:schemeClr val="tx2"/>
-              </a:buClr>
-              <a:buSzTx/>
-              <a:buFont typeface="Arial" panose="020B0604020202020204" pitchFamily="34" charset="0"/>
-              <a:buNone/>
-              <a:tabLst/>
-              <a:defRPr/>
-            </a:pPr>
-            <a:r>
-              <a:rPr lang="en-GB" noProof="0" dirty="0" err="1"/>
-              <a:t>Nime</a:t>
-            </a:r>
-            <a:r>
-              <a:rPr lang="en-GB" noProof="0" dirty="0"/>
-              <a:t> </a:t>
-            </a:r>
-            <a:r>
-              <a:rPr lang="en-GB" noProof="0" dirty="0" err="1"/>
-              <a:t>por</a:t>
-            </a:r>
-            <a:r>
-              <a:rPr lang="en-GB" noProof="0" dirty="0"/>
-              <a:t> sum que </a:t>
-            </a:r>
-            <a:r>
-              <a:rPr lang="en-GB" noProof="0" dirty="0" err="1"/>
-              <a:t>nonecabo</a:t>
-            </a:r>
-            <a:r>
-              <a:rPr lang="en-GB" noProof="0" dirty="0"/>
-              <a:t>. </a:t>
-            </a:r>
-            <a:r>
-              <a:rPr lang="en-GB" noProof="0" dirty="0" err="1"/>
-              <a:t>Gitis</a:t>
-            </a:r>
-            <a:r>
-              <a:rPr lang="en-GB" noProof="0" dirty="0"/>
-              <a:t> ex </a:t>
-            </a:r>
-            <a:r>
-              <a:rPr lang="en-GB" noProof="0" dirty="0" err="1"/>
-              <a:t>quistius</a:t>
-            </a:r>
-            <a:r>
-              <a:rPr lang="en-GB" noProof="0" dirty="0"/>
-              <a:t> </a:t>
-            </a:r>
-            <a:r>
-              <a:rPr lang="en-GB" noProof="0" dirty="0" err="1"/>
-              <a:t>reptatibusae</a:t>
-            </a:r>
-            <a:r>
-              <a:rPr lang="en-GB" noProof="0" dirty="0"/>
-              <a:t> pa </a:t>
-            </a:r>
-            <a:r>
-              <a:rPr lang="en-GB" noProof="0" dirty="0" err="1"/>
-              <a:t>pellent</a:t>
-            </a:r>
-            <a:r>
-              <a:rPr lang="en-GB" noProof="0" dirty="0"/>
-              <a:t> et </a:t>
-            </a:r>
-            <a:r>
-              <a:rPr lang="en-GB" noProof="0" dirty="0" err="1"/>
-              <a:t>illud</a:t>
-            </a:r>
-            <a:r>
-              <a:rPr lang="en-GB" noProof="0" dirty="0"/>
-              <a:t> </a:t>
-            </a:r>
-            <a:r>
-              <a:rPr lang="en-GB" noProof="0" dirty="0" err="1"/>
-              <a:t>eumqui</a:t>
-            </a:r>
-            <a:r>
-              <a:rPr lang="en-GB" noProof="0" dirty="0"/>
-              <a:t> </a:t>
-            </a:r>
-            <a:r>
-              <a:rPr lang="en-GB" noProof="0" dirty="0" err="1"/>
-              <a:t>dolupta</a:t>
-            </a:r>
-            <a:r>
-              <a:rPr lang="en-GB" noProof="0" dirty="0"/>
-              <a:t> </a:t>
-            </a:r>
-            <a:r>
-              <a:rPr lang="en-GB" noProof="0" dirty="0" err="1"/>
-              <a:t>volupta</a:t>
-            </a:r>
-            <a:r>
-              <a:rPr lang="en-GB" noProof="0" dirty="0"/>
-              <a:t> </a:t>
-            </a:r>
-            <a:r>
-              <a:rPr lang="en-GB" noProof="0" dirty="0" err="1"/>
-              <a:t>consedis</a:t>
-            </a:r>
-            <a:r>
-              <a:rPr lang="en-GB" noProof="0" dirty="0"/>
-              <a:t> </a:t>
-            </a:r>
-            <a:r>
-              <a:rPr lang="en-GB" noProof="0" dirty="0" err="1"/>
-              <a:t>ipiet</a:t>
-            </a:r>
-            <a:r>
-              <a:rPr lang="en-GB" noProof="0" dirty="0"/>
-              <a:t> </a:t>
-            </a:r>
-            <a:r>
-              <a:rPr lang="en-GB" noProof="0" dirty="0" err="1"/>
-              <a:t>accusam</a:t>
-            </a:r>
-            <a:r>
-              <a:rPr lang="en-GB" noProof="0" dirty="0"/>
-              <a:t> </a:t>
-            </a:r>
-            <a:r>
-              <a:rPr lang="en-GB" noProof="0" dirty="0" err="1"/>
-              <a:t>dolorias</a:t>
-            </a:r>
-            <a:r>
-              <a:rPr lang="en-GB" noProof="0" dirty="0"/>
-              <a:t> </a:t>
-            </a:r>
-            <a:r>
-              <a:rPr lang="en-GB" noProof="0" dirty="0" err="1"/>
-              <a:t>aut</a:t>
-            </a:r>
-            <a:r>
-              <a:rPr lang="en-GB" noProof="0" dirty="0"/>
-              <a:t> et </a:t>
-            </a:r>
-            <a:r>
-              <a:rPr lang="en-GB" noProof="0" dirty="0" err="1"/>
-              <a:t>estiber</a:t>
-            </a:r>
-            <a:r>
-              <a:rPr lang="en-GB" noProof="0" dirty="0"/>
-              <a:t> </a:t>
-            </a:r>
-            <a:r>
-              <a:rPr lang="en-GB" noProof="0" dirty="0" err="1"/>
-              <a:t>dixitius</a:t>
-            </a:r>
-            <a:r>
-              <a:rPr lang="en-GB" noProof="0" dirty="0"/>
-              <a:t> </a:t>
-            </a:r>
-            <a:r>
-              <a:rPr lang="en-GB" noProof="0" dirty="0" err="1"/>
-              <a:t>orporem</a:t>
-            </a:r>
-            <a:r>
-              <a:rPr lang="en-GB" noProof="0" dirty="0"/>
-              <a:t> </a:t>
-            </a:r>
-            <a:r>
-              <a:rPr lang="en-GB" noProof="0" dirty="0" err="1"/>
-              <a:t>olorita</a:t>
-            </a:r>
-            <a:r>
-              <a:rPr lang="en-GB" noProof="0" dirty="0"/>
-              <a:t> </a:t>
-            </a:r>
-            <a:r>
-              <a:rPr lang="en-GB" noProof="0" dirty="0" err="1"/>
-              <a:t>sperferum</a:t>
-            </a:r>
-            <a:r>
-              <a:rPr lang="en-GB" noProof="0" dirty="0"/>
-              <a:t> </a:t>
-            </a:r>
-            <a:r>
-              <a:rPr lang="en-GB" noProof="0" dirty="0" err="1"/>
-              <a:t>rectamet</a:t>
-            </a:r>
-            <a:r>
-              <a:rPr lang="en-GB" noProof="0" dirty="0"/>
-              <a:t> se </a:t>
-            </a:r>
-            <a:r>
-              <a:rPr lang="en-GB" noProof="0" dirty="0" err="1"/>
-              <a:t>explaciis</a:t>
-            </a:r>
-            <a:r>
-              <a:rPr lang="en-GB" noProof="0" dirty="0"/>
-              <a:t> </a:t>
-            </a:r>
-            <a:r>
-              <a:rPr lang="en-GB" noProof="0" dirty="0" err="1"/>
-              <a:t>est</a:t>
-            </a:r>
-            <a:r>
-              <a:rPr lang="en-GB" noProof="0" dirty="0"/>
-              <a:t> </a:t>
-            </a:r>
-            <a:r>
-              <a:rPr lang="en-GB" noProof="0" dirty="0" err="1"/>
-              <a:t>fuga</a:t>
-            </a:r>
-            <a:r>
-              <a:rPr lang="en-GB" noProof="0" dirty="0"/>
-              <a:t>. </a:t>
-            </a:r>
-            <a:r>
-              <a:rPr lang="en-GB" noProof="0" dirty="0" err="1"/>
-              <a:t>Pellent</a:t>
-            </a:r>
-            <a:r>
-              <a:rPr lang="en-GB" noProof="0" dirty="0"/>
-              <a:t> </a:t>
-            </a:r>
-            <a:r>
-              <a:rPr lang="en-GB" noProof="0" dirty="0" err="1"/>
-              <a:t>eumqubus</a:t>
-            </a:r>
-            <a:r>
-              <a:rPr lang="en-GB" noProof="0" dirty="0"/>
-              <a:t> </a:t>
-            </a:r>
-            <a:r>
-              <a:rPr lang="en-GB" noProof="0" dirty="0" err="1"/>
-              <a:t>dolupta</a:t>
-            </a:r>
-            <a:r>
-              <a:rPr lang="en-GB" noProof="0" dirty="0"/>
-              <a:t> </a:t>
-            </a:r>
-            <a:r>
-              <a:rPr lang="en-GB" noProof="0" dirty="0" err="1"/>
-              <a:t>volupta</a:t>
-            </a:r>
-            <a:r>
-              <a:rPr lang="en-GB" noProof="0" dirty="0"/>
-              <a:t> </a:t>
-            </a:r>
-            <a:r>
-              <a:rPr lang="en-GB" noProof="0" dirty="0" err="1"/>
-              <a:t>consedis</a:t>
-            </a:r>
-            <a:r>
-              <a:rPr lang="en-GB" noProof="0" dirty="0"/>
-              <a:t> </a:t>
-            </a:r>
-            <a:r>
-              <a:rPr lang="en-GB" noProof="0" dirty="0" err="1"/>
-              <a:t>ipiet</a:t>
-            </a:r>
-            <a:r>
-              <a:rPr lang="en-GB" noProof="0" dirty="0"/>
-              <a:t> </a:t>
-            </a:r>
-            <a:r>
-              <a:rPr lang="en-GB" noProof="0" dirty="0" err="1"/>
-              <a:t>dixit</a:t>
-            </a:r>
-            <a:r>
-              <a:rPr lang="en-GB" noProof="0" dirty="0"/>
-              <a:t> et ex </a:t>
-            </a:r>
-            <a:r>
-              <a:rPr lang="en-GB" noProof="0" dirty="0" err="1"/>
-              <a:t>accusam</a:t>
-            </a:r>
-            <a:r>
-              <a:rPr lang="en-GB" noProof="0" dirty="0"/>
-              <a:t> </a:t>
-            </a:r>
-            <a:r>
-              <a:rPr lang="en-GB" noProof="0" dirty="0" err="1"/>
-              <a:t>dolaris</a:t>
-            </a:r>
-            <a:r>
-              <a:rPr lang="en-GB" noProof="0" dirty="0"/>
-              <a:t>. Lorem ipsum </a:t>
-            </a:r>
-            <a:r>
-              <a:rPr lang="en-GB" noProof="0" dirty="0" err="1"/>
-              <a:t>dolor</a:t>
-            </a:r>
-            <a:r>
-              <a:rPr lang="en-GB" noProof="0" dirty="0"/>
-              <a:t> sit </a:t>
-            </a:r>
-            <a:r>
-              <a:rPr lang="en-GB" noProof="0" dirty="0" err="1"/>
-              <a:t>amet</a:t>
-            </a:r>
-            <a:r>
-              <a:rPr lang="en-GB" noProof="0" dirty="0"/>
-              <a:t> rana a folio </a:t>
-            </a:r>
-            <a:r>
-              <a:rPr lang="en-GB" noProof="0" dirty="0" err="1"/>
-              <a:t>dixit</a:t>
-            </a:r>
-            <a:r>
-              <a:rPr lang="en-GB" noProof="0" dirty="0"/>
-              <a:t> et magnus </a:t>
-            </a:r>
-            <a:r>
-              <a:rPr lang="en-GB" noProof="0" dirty="0" err="1"/>
-              <a:t>romana</a:t>
-            </a:r>
-            <a:r>
-              <a:rPr lang="en-GB" noProof="0" dirty="0"/>
-              <a:t> </a:t>
-            </a:r>
-            <a:r>
-              <a:rPr lang="en-GB" noProof="0" dirty="0" err="1"/>
-              <a:t>dias</a:t>
-            </a:r>
-            <a:r>
-              <a:rPr lang="en-GB" noProof="0" dirty="0"/>
-              <a:t> </a:t>
-            </a:r>
-            <a:r>
-              <a:rPr lang="en-GB" noProof="0" dirty="0" err="1"/>
-              <a:t>es</a:t>
-            </a:r>
-            <a:r>
-              <a:rPr lang="en-GB" noProof="0" dirty="0"/>
-              <a:t> </a:t>
-            </a:r>
-            <a:r>
-              <a:rPr lang="en-GB" noProof="0" dirty="0" err="1"/>
-              <a:t>regis</a:t>
-            </a:r>
-            <a:r>
-              <a:rPr lang="en-GB" noProof="0" dirty="0"/>
-              <a:t>. </a:t>
-            </a:r>
-            <a:r>
-              <a:rPr lang="en-GB" noProof="0" dirty="0" err="1"/>
-              <a:t>Daedulus</a:t>
-            </a:r>
-            <a:r>
-              <a:rPr lang="en-GB" noProof="0" dirty="0"/>
-              <a:t> fugit ex libris </a:t>
-            </a:r>
-            <a:r>
-              <a:rPr lang="en-GB" noProof="0" dirty="0" err="1"/>
-              <a:t>consedis</a:t>
-            </a:r>
-            <a:r>
-              <a:rPr lang="en-GB" noProof="0" dirty="0"/>
-              <a:t> </a:t>
-            </a:r>
-            <a:r>
-              <a:rPr lang="en-GB" noProof="0" dirty="0" err="1"/>
-              <a:t>ipiet</a:t>
-            </a:r>
-            <a:r>
-              <a:rPr lang="en-GB" noProof="0" dirty="0"/>
-              <a:t> </a:t>
-            </a:r>
-            <a:r>
-              <a:rPr lang="en-GB" noProof="0" dirty="0" err="1"/>
-              <a:t>accusam</a:t>
-            </a:r>
-            <a:r>
-              <a:rPr lang="en-GB" noProof="0" dirty="0"/>
-              <a:t>. </a:t>
-            </a:r>
-            <a:r>
-              <a:rPr lang="en-GB" noProof="0" dirty="0" err="1"/>
-              <a:t>Pellent</a:t>
-            </a:r>
-            <a:r>
-              <a:rPr lang="en-GB" noProof="0" dirty="0"/>
-              <a:t> </a:t>
-            </a:r>
-            <a:r>
-              <a:rPr lang="en-GB" noProof="0" dirty="0" err="1"/>
-              <a:t>folibus</a:t>
-            </a:r>
-            <a:r>
-              <a:rPr lang="en-GB" noProof="0" dirty="0"/>
-              <a:t> </a:t>
-            </a:r>
-            <a:r>
-              <a:rPr lang="en-GB" noProof="0" dirty="0" err="1"/>
-              <a:t>eumqubus</a:t>
-            </a:r>
-            <a:r>
-              <a:rPr lang="en-GB" noProof="0" dirty="0"/>
-              <a:t> </a:t>
-            </a:r>
-            <a:r>
-              <a:rPr lang="en-GB" noProof="0" dirty="0" err="1"/>
-              <a:t>dolupta</a:t>
-            </a:r>
-            <a:r>
-              <a:rPr lang="en-GB" noProof="0" dirty="0"/>
-              <a:t> </a:t>
-            </a:r>
-            <a:r>
-              <a:rPr lang="en-GB" noProof="0" dirty="0" err="1"/>
-              <a:t>volupta</a:t>
-            </a:r>
-            <a:r>
-              <a:rPr lang="en-GB" noProof="0" dirty="0"/>
-              <a:t> </a:t>
-            </a:r>
-            <a:r>
-              <a:rPr lang="en-GB" noProof="0" dirty="0" err="1"/>
-              <a:t>consedis</a:t>
-            </a:r>
-            <a:r>
-              <a:rPr lang="en-GB" noProof="0" dirty="0"/>
-              <a:t> </a:t>
-            </a:r>
-            <a:r>
-              <a:rPr lang="en-GB" noProof="0" dirty="0" err="1"/>
-              <a:t>ipiet</a:t>
-            </a:r>
-            <a:r>
-              <a:rPr lang="en-GB" noProof="0" dirty="0"/>
-              <a:t> </a:t>
-            </a:r>
-            <a:r>
-              <a:rPr lang="en-GB" noProof="0" dirty="0" err="1"/>
-              <a:t>dixit</a:t>
-            </a:r>
-            <a:r>
-              <a:rPr lang="en-GB" noProof="0" dirty="0"/>
-              <a:t> et </a:t>
-            </a:r>
-            <a:r>
-              <a:rPr lang="en-GB" noProof="0" dirty="0" err="1"/>
-              <a:t>accusam</a:t>
-            </a:r>
-            <a:r>
-              <a:rPr lang="en-GB" noProof="0" dirty="0"/>
-              <a:t> </a:t>
-            </a:r>
-            <a:r>
-              <a:rPr lang="en-GB" noProof="0" dirty="0" err="1"/>
-              <a:t>dolaris</a:t>
-            </a:r>
-            <a:r>
-              <a:rPr lang="en-GB" noProof="0" dirty="0"/>
-              <a:t>. Lorem ipsum </a:t>
-            </a:r>
-            <a:r>
-              <a:rPr lang="en-GB" noProof="0" dirty="0" err="1"/>
-              <a:t>dolor</a:t>
-            </a:r>
-            <a:r>
-              <a:rPr lang="en-GB" noProof="0" dirty="0"/>
-              <a:t> sit </a:t>
-            </a:r>
-            <a:r>
-              <a:rPr lang="en-GB" noProof="0" dirty="0" err="1"/>
-              <a:t>amet</a:t>
-            </a:r>
-            <a:r>
-              <a:rPr lang="en-GB" noProof="0" dirty="0"/>
-              <a:t> rana a folio </a:t>
-            </a:r>
-            <a:r>
-              <a:rPr lang="en-GB" noProof="0" dirty="0" err="1"/>
-              <a:t>dixit</a:t>
-            </a:r>
-            <a:r>
-              <a:rPr lang="en-GB" noProof="0" dirty="0"/>
-              <a:t> et magnus </a:t>
-            </a:r>
-            <a:r>
-              <a:rPr lang="en-GB" noProof="0" dirty="0" err="1"/>
-              <a:t>romana</a:t>
-            </a:r>
-            <a:r>
-              <a:rPr lang="en-GB" noProof="0" dirty="0"/>
-              <a:t> </a:t>
-            </a:r>
-            <a:r>
-              <a:rPr lang="en-GB" noProof="0" dirty="0" err="1"/>
-              <a:t>dias</a:t>
-            </a:r>
-            <a:r>
-              <a:rPr lang="en-GB" noProof="0" dirty="0"/>
-              <a:t> </a:t>
-            </a:r>
-            <a:r>
-              <a:rPr lang="en-GB" noProof="0" dirty="0" err="1"/>
-              <a:t>es</a:t>
-            </a:r>
-            <a:r>
-              <a:rPr lang="en-GB" noProof="0" dirty="0"/>
-              <a:t> </a:t>
-            </a:r>
-            <a:r>
-              <a:rPr lang="en-GB" noProof="0" dirty="0" err="1"/>
-              <a:t>regis</a:t>
-            </a:r>
-            <a:r>
-              <a:rPr lang="en-GB" noProof="0" dirty="0"/>
-              <a:t>. </a:t>
-            </a:r>
-            <a:r>
-              <a:rPr lang="en-GB" noProof="0" dirty="0" err="1"/>
-              <a:t>Daedulus</a:t>
-            </a:r>
-            <a:r>
-              <a:rPr lang="en-GB" noProof="0" dirty="0"/>
-              <a:t> fugit ex libris </a:t>
-            </a:r>
-            <a:r>
-              <a:rPr lang="en-GB" noProof="0" dirty="0" err="1"/>
-              <a:t>consedis</a:t>
-            </a:r>
-            <a:r>
-              <a:rPr lang="en-GB" noProof="0" dirty="0"/>
-              <a:t> </a:t>
-            </a:r>
-            <a:r>
-              <a:rPr lang="en-GB" noProof="0" dirty="0" err="1"/>
-              <a:t>ipiet</a:t>
-            </a:r>
-            <a:r>
-              <a:rPr lang="en-GB" noProof="0" dirty="0"/>
-              <a:t> </a:t>
-            </a:r>
-            <a:r>
-              <a:rPr lang="en-GB" noProof="0" dirty="0" err="1"/>
-              <a:t>accusam</a:t>
-            </a:r>
-            <a:r>
-              <a:rPr lang="en-GB" noProof="0" dirty="0"/>
-              <a:t>.</a:t>
-            </a:r>
-          </a:p>
-        </p:txBody>
-      </p:sp>
-      <p:sp>
-        <p:nvSpPr>
-          <p:cNvPr id="43" name="Text Placeholder 58">
-            <a:extLst>
-              <a:ext uri="{FF2B5EF4-FFF2-40B4-BE49-F238E27FC236}">
-                <a16:creationId xmlns:a16="http://schemas.microsoft.com/office/drawing/2014/main" id="{5FA72DD8-B99E-A745-BF03-9365086E8DD8}"/>
-              </a:ext>
-            </a:extLst>
-          </p:cNvPr>
-          <p:cNvSpPr>
-            <a:spLocks noGrp="1"/>
-          </p:cNvSpPr>
-          <p:nvPr>
-            <p:ph type="body" sz="quarter" idx="29" hasCustomPrompt="1"/>
-          </p:nvPr>
-        </p:nvSpPr>
-        <p:spPr>
-          <a:xfrm>
-            <a:off x="4186646" y="1706400"/>
-            <a:ext cx="3777300" cy="313650"/>
-          </a:xfrm>
-        </p:spPr>
-        <p:txBody>
-          <a:bodyPr/>
-          <a:lstStyle>
-            <a:lvl1pPr>
-              <a:lnSpc>
-                <a:spcPts val="2850"/>
-              </a:lnSpc>
-              <a:spcBef>
-                <a:spcPts val="0"/>
-              </a:spcBef>
-              <a:defRPr sz="2800" cap="all" baseline="0">
-                <a:latin typeface="Impact" panose="020B0806030902050204" pitchFamily="34" charset="0"/>
-              </a:defRPr>
-            </a:lvl1pPr>
-          </a:lstStyle>
-          <a:p>
-            <a:pPr lvl="0"/>
-            <a:r>
-              <a:rPr lang="en-US" dirty="0"/>
-              <a:t>Subtitle</a:t>
-            </a:r>
-            <a:endParaRPr lang="en-GB" dirty="0"/>
-          </a:p>
-        </p:txBody>
-      </p:sp>
-      <p:sp>
-        <p:nvSpPr>
-          <p:cNvPr id="47" name="Content Placeholder 2">
-            <a:extLst>
-              <a:ext uri="{FF2B5EF4-FFF2-40B4-BE49-F238E27FC236}">
-                <a16:creationId xmlns:a16="http://schemas.microsoft.com/office/drawing/2014/main" id="{9BC7D0C9-B06B-4E43-B858-AC7DAC23FA05}"/>
-              </a:ext>
-            </a:extLst>
-          </p:cNvPr>
-          <p:cNvSpPr>
-            <a:spLocks noGrp="1"/>
-          </p:cNvSpPr>
-          <p:nvPr>
-            <p:ph sz="quarter" idx="30" hasCustomPrompt="1"/>
-          </p:nvPr>
-        </p:nvSpPr>
-        <p:spPr>
-          <a:xfrm>
-            <a:off x="8213400" y="2120400"/>
-            <a:ext cx="3745238" cy="3860502"/>
-          </a:xfrm>
-        </p:spPr>
-        <p:txBody>
-          <a:bodyPr anchor="t"/>
-          <a:lstStyle>
-            <a:lvl1pPr marL="0" marR="0" indent="0" algn="l" defTabSz="914400" rtl="0" eaLnBrk="1" fontAlgn="auto" latinLnBrk="0" hangingPunct="1">
-              <a:lnSpc>
-                <a:spcPts val="1850"/>
-              </a:lnSpc>
-              <a:spcBef>
-                <a:spcPts val="0"/>
-              </a:spcBef>
-              <a:spcAft>
-                <a:spcPts val="400"/>
-              </a:spcAft>
-              <a:buClr>
-                <a:schemeClr val="tx2"/>
-              </a:buClr>
-              <a:buSzTx/>
-              <a:buFont typeface="Arial" panose="020B0604020202020204" pitchFamily="34" charset="0"/>
-              <a:buNone/>
-              <a:tabLst/>
-              <a:defRPr/>
-            </a:lvl1pPr>
-          </a:lstStyle>
-          <a:p>
-            <a:pPr marL="0" marR="0" lvl="0" indent="0" algn="l" defTabSz="914400" rtl="0" eaLnBrk="1" fontAlgn="auto" latinLnBrk="0" hangingPunct="1">
-              <a:lnSpc>
-                <a:spcPts val="1850"/>
-              </a:lnSpc>
-              <a:spcBef>
-                <a:spcPts val="0"/>
-              </a:spcBef>
-              <a:spcAft>
-                <a:spcPts val="400"/>
-              </a:spcAft>
-              <a:buClr>
-                <a:schemeClr val="tx2"/>
-              </a:buClr>
-              <a:buSzTx/>
-              <a:buFont typeface="Arial" panose="020B0604020202020204" pitchFamily="34" charset="0"/>
-              <a:buNone/>
-              <a:tabLst/>
-              <a:defRPr/>
-            </a:pPr>
-            <a:r>
-              <a:rPr lang="en-GB" noProof="0" dirty="0" err="1"/>
-              <a:t>Nime</a:t>
-            </a:r>
-            <a:r>
-              <a:rPr lang="en-GB" noProof="0" dirty="0"/>
-              <a:t> </a:t>
-            </a:r>
-            <a:r>
-              <a:rPr lang="en-GB" noProof="0" dirty="0" err="1"/>
-              <a:t>por</a:t>
-            </a:r>
-            <a:r>
-              <a:rPr lang="en-GB" noProof="0" dirty="0"/>
-              <a:t> sum que </a:t>
-            </a:r>
-            <a:r>
-              <a:rPr lang="en-GB" noProof="0" dirty="0" err="1"/>
-              <a:t>nonecabo</a:t>
-            </a:r>
-            <a:r>
-              <a:rPr lang="en-GB" noProof="0" dirty="0"/>
-              <a:t>. </a:t>
-            </a:r>
-            <a:r>
-              <a:rPr lang="en-GB" noProof="0" dirty="0" err="1"/>
-              <a:t>Gitis</a:t>
-            </a:r>
-            <a:r>
-              <a:rPr lang="en-GB" noProof="0" dirty="0"/>
-              <a:t> ex </a:t>
-            </a:r>
-            <a:r>
-              <a:rPr lang="en-GB" noProof="0" dirty="0" err="1"/>
-              <a:t>quistius</a:t>
-            </a:r>
-            <a:r>
-              <a:rPr lang="en-GB" noProof="0" dirty="0"/>
-              <a:t> </a:t>
-            </a:r>
-            <a:r>
-              <a:rPr lang="en-GB" noProof="0" dirty="0" err="1"/>
-              <a:t>reptatibusae</a:t>
-            </a:r>
-            <a:r>
-              <a:rPr lang="en-GB" noProof="0" dirty="0"/>
-              <a:t> pa </a:t>
-            </a:r>
-            <a:r>
-              <a:rPr lang="en-GB" noProof="0" dirty="0" err="1"/>
-              <a:t>pellent</a:t>
-            </a:r>
-            <a:r>
-              <a:rPr lang="en-GB" noProof="0" dirty="0"/>
-              <a:t> et </a:t>
-            </a:r>
-            <a:r>
-              <a:rPr lang="en-GB" noProof="0" dirty="0" err="1"/>
-              <a:t>illud</a:t>
-            </a:r>
-            <a:r>
-              <a:rPr lang="en-GB" noProof="0" dirty="0"/>
-              <a:t> </a:t>
-            </a:r>
-            <a:r>
-              <a:rPr lang="en-GB" noProof="0" dirty="0" err="1"/>
-              <a:t>eumqui</a:t>
-            </a:r>
-            <a:r>
-              <a:rPr lang="en-GB" noProof="0" dirty="0"/>
-              <a:t> </a:t>
-            </a:r>
-            <a:r>
-              <a:rPr lang="en-GB" noProof="0" dirty="0" err="1"/>
-              <a:t>dolupta</a:t>
-            </a:r>
-            <a:r>
-              <a:rPr lang="en-GB" noProof="0" dirty="0"/>
-              <a:t> </a:t>
-            </a:r>
-            <a:r>
-              <a:rPr lang="en-GB" noProof="0" dirty="0" err="1"/>
-              <a:t>volupta</a:t>
-            </a:r>
-            <a:r>
-              <a:rPr lang="en-GB" noProof="0" dirty="0"/>
-              <a:t> </a:t>
-            </a:r>
-            <a:r>
-              <a:rPr lang="en-GB" noProof="0" dirty="0" err="1"/>
-              <a:t>consedis</a:t>
-            </a:r>
-            <a:r>
-              <a:rPr lang="en-GB" noProof="0" dirty="0"/>
-              <a:t> </a:t>
-            </a:r>
-            <a:r>
-              <a:rPr lang="en-GB" noProof="0" dirty="0" err="1"/>
-              <a:t>ipiet</a:t>
-            </a:r>
-            <a:r>
-              <a:rPr lang="en-GB" noProof="0" dirty="0"/>
-              <a:t> </a:t>
-            </a:r>
-            <a:r>
-              <a:rPr lang="en-GB" noProof="0" dirty="0" err="1"/>
-              <a:t>accusam</a:t>
-            </a:r>
-            <a:r>
-              <a:rPr lang="en-GB" noProof="0" dirty="0"/>
-              <a:t> </a:t>
-            </a:r>
-            <a:r>
-              <a:rPr lang="en-GB" noProof="0" dirty="0" err="1"/>
-              <a:t>dolorias</a:t>
-            </a:r>
-            <a:r>
-              <a:rPr lang="en-GB" noProof="0" dirty="0"/>
-              <a:t> </a:t>
-            </a:r>
-            <a:r>
-              <a:rPr lang="en-GB" noProof="0" dirty="0" err="1"/>
-              <a:t>aut</a:t>
-            </a:r>
-            <a:r>
-              <a:rPr lang="en-GB" noProof="0" dirty="0"/>
-              <a:t> et </a:t>
-            </a:r>
-            <a:r>
-              <a:rPr lang="en-GB" noProof="0" dirty="0" err="1"/>
-              <a:t>estiber</a:t>
-            </a:r>
-            <a:r>
-              <a:rPr lang="en-GB" noProof="0" dirty="0"/>
-              <a:t> </a:t>
-            </a:r>
-            <a:r>
-              <a:rPr lang="en-GB" noProof="0" dirty="0" err="1"/>
-              <a:t>dixitius</a:t>
-            </a:r>
-            <a:r>
-              <a:rPr lang="en-GB" noProof="0" dirty="0"/>
-              <a:t> </a:t>
-            </a:r>
-            <a:r>
-              <a:rPr lang="en-GB" noProof="0" dirty="0" err="1"/>
-              <a:t>orporem</a:t>
-            </a:r>
-            <a:r>
-              <a:rPr lang="en-GB" noProof="0" dirty="0"/>
-              <a:t> </a:t>
-            </a:r>
-            <a:r>
-              <a:rPr lang="en-GB" noProof="0" dirty="0" err="1"/>
-              <a:t>olorita</a:t>
-            </a:r>
-            <a:r>
-              <a:rPr lang="en-GB" noProof="0" dirty="0"/>
-              <a:t> </a:t>
-            </a:r>
-            <a:r>
-              <a:rPr lang="en-GB" noProof="0" dirty="0" err="1"/>
-              <a:t>sperferum</a:t>
-            </a:r>
-            <a:r>
-              <a:rPr lang="en-GB" noProof="0" dirty="0"/>
-              <a:t> </a:t>
-            </a:r>
-            <a:r>
-              <a:rPr lang="en-GB" noProof="0" dirty="0" err="1"/>
-              <a:t>rectamet</a:t>
-            </a:r>
-            <a:r>
-              <a:rPr lang="en-GB" noProof="0" dirty="0"/>
-              <a:t> se </a:t>
-            </a:r>
-            <a:r>
-              <a:rPr lang="en-GB" noProof="0" dirty="0" err="1"/>
-              <a:t>explaciis</a:t>
-            </a:r>
-            <a:r>
-              <a:rPr lang="en-GB" noProof="0" dirty="0"/>
-              <a:t> </a:t>
-            </a:r>
-            <a:r>
-              <a:rPr lang="en-GB" noProof="0" dirty="0" err="1"/>
-              <a:t>est</a:t>
-            </a:r>
-            <a:r>
-              <a:rPr lang="en-GB" noProof="0" dirty="0"/>
-              <a:t> </a:t>
-            </a:r>
-            <a:r>
-              <a:rPr lang="en-GB" noProof="0" dirty="0" err="1"/>
-              <a:t>fuga</a:t>
-            </a:r>
-            <a:r>
-              <a:rPr lang="en-GB" noProof="0" dirty="0"/>
-              <a:t>. </a:t>
-            </a:r>
-            <a:r>
-              <a:rPr lang="en-GB" noProof="0" dirty="0" err="1"/>
-              <a:t>Pellent</a:t>
-            </a:r>
-            <a:r>
-              <a:rPr lang="en-GB" noProof="0" dirty="0"/>
-              <a:t> </a:t>
-            </a:r>
-            <a:r>
-              <a:rPr lang="en-GB" noProof="0" dirty="0" err="1"/>
-              <a:t>eumqubus</a:t>
-            </a:r>
-            <a:r>
-              <a:rPr lang="en-GB" noProof="0" dirty="0"/>
-              <a:t> </a:t>
-            </a:r>
-            <a:r>
-              <a:rPr lang="en-GB" noProof="0" dirty="0" err="1"/>
-              <a:t>dolupta</a:t>
-            </a:r>
-            <a:r>
-              <a:rPr lang="en-GB" noProof="0" dirty="0"/>
-              <a:t> </a:t>
-            </a:r>
-            <a:r>
-              <a:rPr lang="en-GB" noProof="0" dirty="0" err="1"/>
-              <a:t>volupta</a:t>
-            </a:r>
-            <a:r>
-              <a:rPr lang="en-GB" noProof="0" dirty="0"/>
-              <a:t> </a:t>
-            </a:r>
-            <a:r>
-              <a:rPr lang="en-GB" noProof="0" dirty="0" err="1"/>
-              <a:t>consedis</a:t>
-            </a:r>
-            <a:r>
-              <a:rPr lang="en-GB" noProof="0" dirty="0"/>
-              <a:t> </a:t>
-            </a:r>
-            <a:r>
-              <a:rPr lang="en-GB" noProof="0" dirty="0" err="1"/>
-              <a:t>ipiet</a:t>
-            </a:r>
-            <a:r>
-              <a:rPr lang="en-GB" noProof="0" dirty="0"/>
-              <a:t> </a:t>
-            </a:r>
-            <a:r>
-              <a:rPr lang="en-GB" noProof="0" dirty="0" err="1"/>
-              <a:t>dixit</a:t>
-            </a:r>
-            <a:r>
-              <a:rPr lang="en-GB" noProof="0" dirty="0"/>
-              <a:t> et ex </a:t>
-            </a:r>
-            <a:r>
-              <a:rPr lang="en-GB" noProof="0" dirty="0" err="1"/>
-              <a:t>accusam</a:t>
-            </a:r>
-            <a:r>
-              <a:rPr lang="en-GB" noProof="0" dirty="0"/>
-              <a:t> </a:t>
-            </a:r>
-            <a:r>
-              <a:rPr lang="en-GB" noProof="0" dirty="0" err="1"/>
-              <a:t>dolaris</a:t>
-            </a:r>
-            <a:r>
-              <a:rPr lang="en-GB" noProof="0" dirty="0"/>
-              <a:t>. Lorem ipsum </a:t>
-            </a:r>
-            <a:r>
-              <a:rPr lang="en-GB" noProof="0" dirty="0" err="1"/>
-              <a:t>dolor</a:t>
-            </a:r>
-            <a:r>
-              <a:rPr lang="en-GB" noProof="0" dirty="0"/>
-              <a:t> sit </a:t>
-            </a:r>
-            <a:r>
-              <a:rPr lang="en-GB" noProof="0" dirty="0" err="1"/>
-              <a:t>amet</a:t>
-            </a:r>
-            <a:r>
-              <a:rPr lang="en-GB" noProof="0" dirty="0"/>
-              <a:t> rana a folio </a:t>
-            </a:r>
-            <a:r>
-              <a:rPr lang="en-GB" noProof="0" dirty="0" err="1"/>
-              <a:t>dixit</a:t>
-            </a:r>
-            <a:r>
-              <a:rPr lang="en-GB" noProof="0" dirty="0"/>
-              <a:t> et magnus </a:t>
-            </a:r>
-            <a:r>
-              <a:rPr lang="en-GB" noProof="0" dirty="0" err="1"/>
-              <a:t>romana</a:t>
-            </a:r>
-            <a:r>
-              <a:rPr lang="en-GB" noProof="0" dirty="0"/>
-              <a:t> </a:t>
-            </a:r>
-            <a:r>
-              <a:rPr lang="en-GB" noProof="0" dirty="0" err="1"/>
-              <a:t>dias</a:t>
-            </a:r>
-            <a:r>
-              <a:rPr lang="en-GB" noProof="0" dirty="0"/>
-              <a:t> </a:t>
-            </a:r>
-            <a:r>
-              <a:rPr lang="en-GB" noProof="0" dirty="0" err="1"/>
-              <a:t>es</a:t>
-            </a:r>
-            <a:r>
-              <a:rPr lang="en-GB" noProof="0" dirty="0"/>
-              <a:t> </a:t>
-            </a:r>
-            <a:r>
-              <a:rPr lang="en-GB" noProof="0" dirty="0" err="1"/>
-              <a:t>regis</a:t>
-            </a:r>
-            <a:r>
-              <a:rPr lang="en-GB" noProof="0" dirty="0"/>
-              <a:t>. </a:t>
-            </a:r>
-            <a:r>
-              <a:rPr lang="en-GB" noProof="0" dirty="0" err="1"/>
-              <a:t>Daedulus</a:t>
-            </a:r>
-            <a:r>
-              <a:rPr lang="en-GB" noProof="0" dirty="0"/>
-              <a:t> fugit ex libris </a:t>
-            </a:r>
-            <a:r>
-              <a:rPr lang="en-GB" noProof="0" dirty="0" err="1"/>
-              <a:t>consedis</a:t>
-            </a:r>
-            <a:r>
-              <a:rPr lang="en-GB" noProof="0" dirty="0"/>
-              <a:t> </a:t>
-            </a:r>
-            <a:r>
-              <a:rPr lang="en-GB" noProof="0" dirty="0" err="1"/>
-              <a:t>ipiet</a:t>
-            </a:r>
-            <a:r>
-              <a:rPr lang="en-GB" noProof="0" dirty="0"/>
-              <a:t> </a:t>
-            </a:r>
-            <a:r>
-              <a:rPr lang="en-GB" noProof="0" dirty="0" err="1"/>
-              <a:t>accusam</a:t>
-            </a:r>
-            <a:r>
-              <a:rPr lang="en-GB" noProof="0" dirty="0"/>
-              <a:t>. </a:t>
-            </a:r>
-            <a:r>
-              <a:rPr lang="en-GB" noProof="0" dirty="0" err="1"/>
-              <a:t>Pellent</a:t>
-            </a:r>
-            <a:r>
-              <a:rPr lang="en-GB" noProof="0" dirty="0"/>
-              <a:t> </a:t>
-            </a:r>
-            <a:r>
-              <a:rPr lang="en-GB" noProof="0" dirty="0" err="1"/>
-              <a:t>folibus</a:t>
-            </a:r>
-            <a:r>
-              <a:rPr lang="en-GB" noProof="0" dirty="0"/>
-              <a:t> </a:t>
-            </a:r>
-            <a:r>
-              <a:rPr lang="en-GB" noProof="0" dirty="0" err="1"/>
-              <a:t>eumqubus</a:t>
-            </a:r>
-            <a:r>
-              <a:rPr lang="en-GB" noProof="0" dirty="0"/>
-              <a:t> </a:t>
-            </a:r>
-            <a:r>
-              <a:rPr lang="en-GB" noProof="0" dirty="0" err="1"/>
-              <a:t>dolupta</a:t>
-            </a:r>
-            <a:r>
-              <a:rPr lang="en-GB" noProof="0" dirty="0"/>
-              <a:t> </a:t>
-            </a:r>
-            <a:r>
-              <a:rPr lang="en-GB" noProof="0" dirty="0" err="1"/>
-              <a:t>volupta</a:t>
-            </a:r>
-            <a:r>
-              <a:rPr lang="en-GB" noProof="0" dirty="0"/>
-              <a:t> </a:t>
-            </a:r>
-            <a:r>
-              <a:rPr lang="en-GB" noProof="0" dirty="0" err="1"/>
-              <a:t>consedis</a:t>
-            </a:r>
-            <a:r>
-              <a:rPr lang="en-GB" noProof="0" dirty="0"/>
-              <a:t> </a:t>
-            </a:r>
-            <a:r>
-              <a:rPr lang="en-GB" noProof="0" dirty="0" err="1"/>
-              <a:t>ipiet</a:t>
-            </a:r>
-            <a:r>
-              <a:rPr lang="en-GB" noProof="0" dirty="0"/>
-              <a:t> </a:t>
-            </a:r>
-            <a:r>
-              <a:rPr lang="en-GB" noProof="0" dirty="0" err="1"/>
-              <a:t>dixit</a:t>
-            </a:r>
-            <a:r>
-              <a:rPr lang="en-GB" noProof="0" dirty="0"/>
-              <a:t> et </a:t>
-            </a:r>
-            <a:r>
-              <a:rPr lang="en-GB" noProof="0" dirty="0" err="1"/>
-              <a:t>accusam</a:t>
-            </a:r>
-            <a:r>
-              <a:rPr lang="en-GB" noProof="0" dirty="0"/>
-              <a:t> </a:t>
-            </a:r>
-            <a:r>
-              <a:rPr lang="en-GB" noProof="0" dirty="0" err="1"/>
-              <a:t>dolaris</a:t>
-            </a:r>
-            <a:r>
-              <a:rPr lang="en-GB" noProof="0" dirty="0"/>
-              <a:t>. Lorem ipsum </a:t>
-            </a:r>
-            <a:r>
-              <a:rPr lang="en-GB" noProof="0" dirty="0" err="1"/>
-              <a:t>dolor</a:t>
-            </a:r>
-            <a:r>
-              <a:rPr lang="en-GB" noProof="0" dirty="0"/>
-              <a:t> sit </a:t>
-            </a:r>
-            <a:r>
-              <a:rPr lang="en-GB" noProof="0" dirty="0" err="1"/>
-              <a:t>amet</a:t>
-            </a:r>
-            <a:r>
-              <a:rPr lang="en-GB" noProof="0" dirty="0"/>
-              <a:t> rana a folio </a:t>
-            </a:r>
-            <a:r>
-              <a:rPr lang="en-GB" noProof="0" dirty="0" err="1"/>
-              <a:t>dixit</a:t>
-            </a:r>
-            <a:r>
-              <a:rPr lang="en-GB" noProof="0" dirty="0"/>
-              <a:t> et magnus </a:t>
-            </a:r>
-            <a:r>
-              <a:rPr lang="en-GB" noProof="0" dirty="0" err="1"/>
-              <a:t>romana</a:t>
-            </a:r>
-            <a:r>
-              <a:rPr lang="en-GB" noProof="0" dirty="0"/>
-              <a:t> </a:t>
-            </a:r>
-            <a:r>
-              <a:rPr lang="en-GB" noProof="0" dirty="0" err="1"/>
-              <a:t>dias</a:t>
-            </a:r>
-            <a:r>
-              <a:rPr lang="en-GB" noProof="0" dirty="0"/>
-              <a:t> </a:t>
-            </a:r>
-            <a:r>
-              <a:rPr lang="en-GB" noProof="0" dirty="0" err="1"/>
-              <a:t>es</a:t>
-            </a:r>
-            <a:r>
-              <a:rPr lang="en-GB" noProof="0" dirty="0"/>
-              <a:t> </a:t>
-            </a:r>
-            <a:r>
-              <a:rPr lang="en-GB" noProof="0" dirty="0" err="1"/>
-              <a:t>regis</a:t>
-            </a:r>
-            <a:r>
-              <a:rPr lang="en-GB" noProof="0" dirty="0"/>
-              <a:t>. </a:t>
-            </a:r>
-            <a:r>
-              <a:rPr lang="en-GB" noProof="0" dirty="0" err="1"/>
-              <a:t>Daedulus</a:t>
-            </a:r>
-            <a:r>
-              <a:rPr lang="en-GB" noProof="0" dirty="0"/>
-              <a:t> fugit ex libris </a:t>
-            </a:r>
-            <a:r>
-              <a:rPr lang="en-GB" noProof="0" dirty="0" err="1"/>
-              <a:t>consedis</a:t>
-            </a:r>
-            <a:r>
-              <a:rPr lang="en-GB" noProof="0" dirty="0"/>
-              <a:t> </a:t>
-            </a:r>
-            <a:r>
-              <a:rPr lang="en-GB" noProof="0" dirty="0" err="1"/>
-              <a:t>ipiet</a:t>
-            </a:r>
-            <a:r>
-              <a:rPr lang="en-GB" noProof="0" dirty="0"/>
-              <a:t> </a:t>
-            </a:r>
-            <a:r>
-              <a:rPr lang="en-GB" noProof="0" dirty="0" err="1"/>
-              <a:t>accusam</a:t>
-            </a:r>
-            <a:r>
-              <a:rPr lang="en-GB" noProof="0" dirty="0"/>
-              <a:t>.</a:t>
-            </a:r>
-          </a:p>
-        </p:txBody>
-      </p:sp>
-      <p:sp>
-        <p:nvSpPr>
-          <p:cNvPr id="49" name="Text Placeholder 58">
-            <a:extLst>
-              <a:ext uri="{FF2B5EF4-FFF2-40B4-BE49-F238E27FC236}">
-                <a16:creationId xmlns:a16="http://schemas.microsoft.com/office/drawing/2014/main" id="{BB11FB6A-B0FD-754E-B1CA-4572D1A409C0}"/>
-              </a:ext>
-            </a:extLst>
-          </p:cNvPr>
-          <p:cNvSpPr>
-            <a:spLocks noGrp="1"/>
-          </p:cNvSpPr>
-          <p:nvPr>
-            <p:ph type="body" sz="quarter" idx="31" hasCustomPrompt="1"/>
-          </p:nvPr>
-        </p:nvSpPr>
-        <p:spPr>
-          <a:xfrm>
-            <a:off x="8213400" y="1706400"/>
-            <a:ext cx="3745238" cy="313650"/>
-          </a:xfrm>
-        </p:spPr>
-        <p:txBody>
-          <a:bodyPr/>
-          <a:lstStyle>
-            <a:lvl1pPr>
-              <a:lnSpc>
-                <a:spcPts val="2850"/>
-              </a:lnSpc>
-              <a:spcBef>
-                <a:spcPts val="0"/>
-              </a:spcBef>
-              <a:defRPr sz="2800" cap="all" baseline="0">
-                <a:latin typeface="Impact" panose="020B0806030902050204" pitchFamily="34" charset="0"/>
-              </a:defRPr>
-            </a:lvl1pPr>
-          </a:lstStyle>
-          <a:p>
-            <a:pPr lvl="0"/>
-            <a:r>
-              <a:rPr lang="en-US" dirty="0"/>
-              <a:t>Subtitle</a:t>
-            </a:r>
-            <a:endParaRPr lang="en-GB" dirty="0"/>
-          </a:p>
-        </p:txBody>
-      </p:sp>
-      <p:sp>
-        <p:nvSpPr>
-          <p:cNvPr id="2" name="Title 4">
-            <a:extLst>
-              <a:ext uri="{FF2B5EF4-FFF2-40B4-BE49-F238E27FC236}">
-                <a16:creationId xmlns:a16="http://schemas.microsoft.com/office/drawing/2014/main" id="{28CEAEF8-64B6-59E0-9DCB-3D773D5A005A}"/>
-              </a:ext>
-            </a:extLst>
-          </p:cNvPr>
-          <p:cNvSpPr>
-            <a:spLocks noGrp="1"/>
-          </p:cNvSpPr>
-          <p:nvPr>
-            <p:ph type="title" hasCustomPrompt="1"/>
-          </p:nvPr>
-        </p:nvSpPr>
-        <p:spPr>
-          <a:xfrm>
-            <a:off x="222578" y="216747"/>
-            <a:ext cx="11736060" cy="899368"/>
-          </a:xfrm>
-        </p:spPr>
-        <p:txBody>
-          <a:bodyPr/>
-          <a:lstStyle>
-            <a:lvl1pPr>
-              <a:lnSpc>
-                <a:spcPts val="3900"/>
-              </a:lnSpc>
-              <a:defRPr sz="3800">
-                <a:solidFill>
-                  <a:schemeClr val="tx1"/>
-                </a:solidFill>
-              </a:defRPr>
-            </a:lvl1pPr>
-          </a:lstStyle>
-          <a:p>
-            <a:r>
-              <a:rPr lang="en-GB" noProof="0" dirty="0"/>
-              <a:t>Page title </a:t>
-            </a:r>
-            <a:br>
-              <a:rPr lang="en-GB" noProof="0" dirty="0"/>
-            </a:br>
-            <a:r>
-              <a:rPr lang="en-GB" noProof="0" dirty="0" err="1"/>
-              <a:t>loreum</a:t>
-            </a:r>
-            <a:r>
-              <a:rPr lang="en-GB" noProof="0" dirty="0"/>
-              <a:t> ipsum </a:t>
-            </a:r>
-            <a:r>
-              <a:rPr lang="en-GB" noProof="0" dirty="0" err="1"/>
-              <a:t>loreum</a:t>
-            </a:r>
-            <a:endParaRPr lang="en-GB" noProof="0" dirty="0"/>
-          </a:p>
-        </p:txBody>
-      </p:sp>
-      <p:sp>
-        <p:nvSpPr>
-          <p:cNvPr id="3" name="Text Placeholder 7">
-            <a:extLst>
-              <a:ext uri="{FF2B5EF4-FFF2-40B4-BE49-F238E27FC236}">
-                <a16:creationId xmlns:a16="http://schemas.microsoft.com/office/drawing/2014/main" id="{95B4A651-3CAA-CC47-23DC-03D2B8FE2023}"/>
-              </a:ext>
-            </a:extLst>
-          </p:cNvPr>
-          <p:cNvSpPr>
-            <a:spLocks noGrp="1"/>
-          </p:cNvSpPr>
-          <p:nvPr>
-            <p:ph type="body" sz="quarter" idx="10" hasCustomPrompt="1"/>
-          </p:nvPr>
-        </p:nvSpPr>
-        <p:spPr>
-          <a:xfrm>
-            <a:off x="223837" y="1250412"/>
-            <a:ext cx="11734801" cy="166687"/>
-          </a:xfrm>
-        </p:spPr>
-        <p:txBody>
-          <a:bodyPr/>
-          <a:lstStyle>
-            <a:lvl1pPr>
-              <a:defRPr b="1">
-                <a:solidFill>
-                  <a:schemeClr val="tx1"/>
-                </a:solidFill>
-              </a:defRPr>
-            </a:lvl1pPr>
-          </a:lstStyle>
-          <a:p>
-            <a:pPr lvl="0"/>
-            <a:r>
-              <a:rPr lang="en-US" dirty="0"/>
-              <a:t>Page subtitle</a:t>
-            </a:r>
-            <a:endParaRPr lang="en-GB" dirty="0"/>
-          </a:p>
-        </p:txBody>
-      </p:sp>
-    </p:spTree>
-    <p:extLst>
-      <p:ext uri="{BB962C8B-B14F-4D97-AF65-F5344CB8AC3E}">
-        <p14:creationId xmlns:p14="http://schemas.microsoft.com/office/powerpoint/2010/main" val="334984900"/>
       </p:ext>
     </p:extLst>
   </p:cSld>
@@ -27290,8 +25443,8 @@
     <p:sldLayoutId id="2147483839" r:id="rId4"/>
     <p:sldLayoutId id="2147483788" r:id="rId5"/>
     <p:sldLayoutId id="2147483789" r:id="rId6"/>
-    <p:sldLayoutId id="2147483790" r:id="rId7"/>
-    <p:sldLayoutId id="2147483791" r:id="rId8"/>
+    <p:sldLayoutId id="2147483791" r:id="rId7"/>
+    <p:sldLayoutId id="2147483790" r:id="rId8"/>
     <p:sldLayoutId id="2147483792" r:id="rId9"/>
     <p:sldLayoutId id="2147483844" r:id="rId10"/>
     <p:sldLayoutId id="2147483819" r:id="rId11"/>
@@ -27789,7 +25942,7 @@
           <a:p>
             <a:fld id="{173DEA02-80BC-4B4A-88AA-63BCC9943E88}" type="datetime3">
               <a:rPr lang="en-US" smtClean="0"/>
-              <a:t>25 August 2023</a:t>
+              <a:t>30 August 2023</a:t>
             </a:fld>
             <a:endParaRPr lang="en-GB" dirty="0"/>
           </a:p>

</xml_diff>

<commit_message>
31_08_23 - final commit
</commit_message>
<xml_diff>
--- a/template/_template.pptx
+++ b/template/_template.pptx
@@ -129,7 +129,7 @@
   <pc:docChgLst>
     <pc:chgData name="Matt Proctor" userId="59d62765-66b3-448d-a2be-08953d376206" providerId="ADAL" clId="{B65B568B-9A63-4EAA-B562-9410F638B9BB}"/>
     <pc:docChg chg="undo custSel addSld delSld modSld delMainMaster modMainMaster">
-      <pc:chgData name="Matt Proctor" userId="59d62765-66b3-448d-a2be-08953d376206" providerId="ADAL" clId="{B65B568B-9A63-4EAA-B562-9410F638B9BB}" dt="2023-08-25T10:14:50.325" v="30" actId="2696"/>
+      <pc:chgData name="Matt Proctor" userId="59d62765-66b3-448d-a2be-08953d376206" providerId="ADAL" clId="{B65B568B-9A63-4EAA-B562-9410F638B9BB}" dt="2023-08-31T08:40:16.615" v="39" actId="2696"/>
       <pc:docMkLst>
         <pc:docMk/>
       </pc:docMkLst>
@@ -243,6 +243,85 @@
         </pc:spChg>
       </pc:sldChg>
       <pc:sldChg chg="addSp delSp modSp new del mod modClrScheme chgLayout">
+        <pc:chgData name="Matt Proctor" userId="59d62765-66b3-448d-a2be-08953d376206" providerId="ADAL" clId="{B65B568B-9A63-4EAA-B562-9410F638B9BB}" dt="2023-08-31T08:40:16.615" v="39" actId="2696"/>
+        <pc:sldMkLst>
+          <pc:docMk/>
+          <pc:sldMk cId="2537664136" sldId="257"/>
+        </pc:sldMkLst>
+        <pc:spChg chg="del mod ord">
+          <ac:chgData name="Matt Proctor" userId="59d62765-66b3-448d-a2be-08953d376206" providerId="ADAL" clId="{B65B568B-9A63-4EAA-B562-9410F638B9BB}" dt="2023-08-31T08:30:28.473" v="37" actId="700"/>
+          <ac:spMkLst>
+            <pc:docMk/>
+            <pc:sldMk cId="2537664136" sldId="257"/>
+            <ac:spMk id="2" creationId="{9ADB926B-F402-0E8C-82A6-7720B4B8229F}"/>
+          </ac:spMkLst>
+        </pc:spChg>
+        <pc:spChg chg="del mod ord">
+          <ac:chgData name="Matt Proctor" userId="59d62765-66b3-448d-a2be-08953d376206" providerId="ADAL" clId="{B65B568B-9A63-4EAA-B562-9410F638B9BB}" dt="2023-08-31T08:39:26.306" v="38" actId="478"/>
+          <ac:spMkLst>
+            <pc:docMk/>
+            <pc:sldMk cId="2537664136" sldId="257"/>
+            <ac:spMk id="3" creationId="{6CA89060-31D6-F599-BB57-01E14E1252EF}"/>
+          </ac:spMkLst>
+        </pc:spChg>
+        <pc:spChg chg="del mod ord">
+          <ac:chgData name="Matt Proctor" userId="59d62765-66b3-448d-a2be-08953d376206" providerId="ADAL" clId="{B65B568B-9A63-4EAA-B562-9410F638B9BB}" dt="2023-08-31T08:30:28.473" v="37" actId="700"/>
+          <ac:spMkLst>
+            <pc:docMk/>
+            <pc:sldMk cId="2537664136" sldId="257"/>
+            <ac:spMk id="4" creationId="{6DD85F48-572D-4450-8C35-EFC098CC6F9A}"/>
+          </ac:spMkLst>
+        </pc:spChg>
+        <pc:spChg chg="add mod ord">
+          <ac:chgData name="Matt Proctor" userId="59d62765-66b3-448d-a2be-08953d376206" providerId="ADAL" clId="{B65B568B-9A63-4EAA-B562-9410F638B9BB}" dt="2023-08-31T08:30:28.473" v="37" actId="700"/>
+          <ac:spMkLst>
+            <pc:docMk/>
+            <pc:sldMk cId="2537664136" sldId="257"/>
+            <ac:spMk id="5" creationId="{AF720906-BDCB-36AA-745E-E4AE0ADC031A}"/>
+          </ac:spMkLst>
+        </pc:spChg>
+        <pc:spChg chg="add mod ord">
+          <ac:chgData name="Matt Proctor" userId="59d62765-66b3-448d-a2be-08953d376206" providerId="ADAL" clId="{B65B568B-9A63-4EAA-B562-9410F638B9BB}" dt="2023-08-31T08:30:28.473" v="37" actId="700"/>
+          <ac:spMkLst>
+            <pc:docMk/>
+            <pc:sldMk cId="2537664136" sldId="257"/>
+            <ac:spMk id="6" creationId="{C7707BF8-612A-119E-99FB-7B276BF58776}"/>
+          </ac:spMkLst>
+        </pc:spChg>
+        <pc:spChg chg="add mod ord">
+          <ac:chgData name="Matt Proctor" userId="59d62765-66b3-448d-a2be-08953d376206" providerId="ADAL" clId="{B65B568B-9A63-4EAA-B562-9410F638B9BB}" dt="2023-08-31T08:30:28.473" v="37" actId="700"/>
+          <ac:spMkLst>
+            <pc:docMk/>
+            <pc:sldMk cId="2537664136" sldId="257"/>
+            <ac:spMk id="7" creationId="{46DF706E-E2F9-E0C9-A6C5-32BAD01A744F}"/>
+          </ac:spMkLst>
+        </pc:spChg>
+        <pc:spChg chg="add mod ord">
+          <ac:chgData name="Matt Proctor" userId="59d62765-66b3-448d-a2be-08953d376206" providerId="ADAL" clId="{B65B568B-9A63-4EAA-B562-9410F638B9BB}" dt="2023-08-31T08:30:28.473" v="37" actId="700"/>
+          <ac:spMkLst>
+            <pc:docMk/>
+            <pc:sldMk cId="2537664136" sldId="257"/>
+            <ac:spMk id="8" creationId="{F59EC5A6-DFD1-F6AF-5C33-9969C51D7F00}"/>
+          </ac:spMkLst>
+        </pc:spChg>
+        <pc:spChg chg="add mod ord">
+          <ac:chgData name="Matt Proctor" userId="59d62765-66b3-448d-a2be-08953d376206" providerId="ADAL" clId="{B65B568B-9A63-4EAA-B562-9410F638B9BB}" dt="2023-08-31T08:30:28.473" v="37" actId="700"/>
+          <ac:spMkLst>
+            <pc:docMk/>
+            <pc:sldMk cId="2537664136" sldId="257"/>
+            <ac:spMk id="9" creationId="{E1551530-FDDE-BDDA-D078-33215594740B}"/>
+          </ac:spMkLst>
+        </pc:spChg>
+        <pc:spChg chg="add mod ord">
+          <ac:chgData name="Matt Proctor" userId="59d62765-66b3-448d-a2be-08953d376206" providerId="ADAL" clId="{B65B568B-9A63-4EAA-B562-9410F638B9BB}" dt="2023-08-31T08:30:28.473" v="37" actId="700"/>
+          <ac:spMkLst>
+            <pc:docMk/>
+            <pc:sldMk cId="2537664136" sldId="257"/>
+            <ac:spMk id="10" creationId="{30315335-BDC9-AAF4-C6AF-0213AD69F896}"/>
+          </ac:spMkLst>
+        </pc:spChg>
+      </pc:sldChg>
+      <pc:sldChg chg="addSp delSp modSp new del mod modClrScheme chgLayout">
         <pc:chgData name="Matt Proctor" userId="59d62765-66b3-448d-a2be-08953d376206" providerId="ADAL" clId="{B65B568B-9A63-4EAA-B562-9410F638B9BB}" dt="2023-08-23T08:38:42.608" v="4" actId="2696"/>
         <pc:sldMkLst>
           <pc:docMk/>
@@ -326,6 +405,85 @@
             <pc:docMk/>
             <pc:sldMk cId="2645140970" sldId="257"/>
             <ac:spMk id="11" creationId="{5C3896FC-5B03-B55E-F758-54572E414B77}"/>
+          </ac:spMkLst>
+        </pc:spChg>
+      </pc:sldChg>
+      <pc:sldChg chg="addSp delSp modSp new del mod modClrScheme chgLayout">
+        <pc:chgData name="Matt Proctor" userId="59d62765-66b3-448d-a2be-08953d376206" providerId="ADAL" clId="{B65B568B-9A63-4EAA-B562-9410F638B9BB}" dt="2023-08-31T08:29:50.658" v="35" actId="2696"/>
+        <pc:sldMkLst>
+          <pc:docMk/>
+          <pc:sldMk cId="3519303869" sldId="257"/>
+        </pc:sldMkLst>
+        <pc:spChg chg="del mod ord">
+          <ac:chgData name="Matt Proctor" userId="59d62765-66b3-448d-a2be-08953d376206" providerId="ADAL" clId="{B65B568B-9A63-4EAA-B562-9410F638B9BB}" dt="2023-08-31T08:18:17.790" v="32" actId="700"/>
+          <ac:spMkLst>
+            <pc:docMk/>
+            <pc:sldMk cId="3519303869" sldId="257"/>
+            <ac:spMk id="2" creationId="{0F7807E3-D1E2-E112-3B9D-1F501733DD5D}"/>
+          </ac:spMkLst>
+        </pc:spChg>
+        <pc:spChg chg="mod ord">
+          <ac:chgData name="Matt Proctor" userId="59d62765-66b3-448d-a2be-08953d376206" providerId="ADAL" clId="{B65B568B-9A63-4EAA-B562-9410F638B9BB}" dt="2023-08-31T08:18:17.790" v="32" actId="700"/>
+          <ac:spMkLst>
+            <pc:docMk/>
+            <pc:sldMk cId="3519303869" sldId="257"/>
+            <ac:spMk id="3" creationId="{A1A8E099-FAE1-8030-E6B8-6CDDD35535A9}"/>
+          </ac:spMkLst>
+        </pc:spChg>
+        <pc:spChg chg="del mod ord">
+          <ac:chgData name="Matt Proctor" userId="59d62765-66b3-448d-a2be-08953d376206" providerId="ADAL" clId="{B65B568B-9A63-4EAA-B562-9410F638B9BB}" dt="2023-08-31T08:18:17.790" v="32" actId="700"/>
+          <ac:spMkLst>
+            <pc:docMk/>
+            <pc:sldMk cId="3519303869" sldId="257"/>
+            <ac:spMk id="4" creationId="{DBFE0113-55EA-0B00-E376-B9E779351B73}"/>
+          </ac:spMkLst>
+        </pc:spChg>
+        <pc:spChg chg="add mod ord">
+          <ac:chgData name="Matt Proctor" userId="59d62765-66b3-448d-a2be-08953d376206" providerId="ADAL" clId="{B65B568B-9A63-4EAA-B562-9410F638B9BB}" dt="2023-08-31T08:18:17.790" v="32" actId="700"/>
+          <ac:spMkLst>
+            <pc:docMk/>
+            <pc:sldMk cId="3519303869" sldId="257"/>
+            <ac:spMk id="5" creationId="{4DA04E71-8FE9-747F-B4F8-A76E1CD65BF9}"/>
+          </ac:spMkLst>
+        </pc:spChg>
+        <pc:spChg chg="add del mod ord">
+          <ac:chgData name="Matt Proctor" userId="59d62765-66b3-448d-a2be-08953d376206" providerId="ADAL" clId="{B65B568B-9A63-4EAA-B562-9410F638B9BB}" dt="2023-08-31T08:18:22.451" v="34" actId="478"/>
+          <ac:spMkLst>
+            <pc:docMk/>
+            <pc:sldMk cId="3519303869" sldId="257"/>
+            <ac:spMk id="6" creationId="{13315E8F-DC0A-B0F7-2E4F-8B6C9B401879}"/>
+          </ac:spMkLst>
+        </pc:spChg>
+        <pc:spChg chg="add mod ord">
+          <ac:chgData name="Matt Proctor" userId="59d62765-66b3-448d-a2be-08953d376206" providerId="ADAL" clId="{B65B568B-9A63-4EAA-B562-9410F638B9BB}" dt="2023-08-31T08:18:17.790" v="32" actId="700"/>
+          <ac:spMkLst>
+            <pc:docMk/>
+            <pc:sldMk cId="3519303869" sldId="257"/>
+            <ac:spMk id="7" creationId="{5A06BDA6-3713-4B6A-0272-5BC4BE4C6CA5}"/>
+          </ac:spMkLst>
+        </pc:spChg>
+        <pc:spChg chg="add mod ord">
+          <ac:chgData name="Matt Proctor" userId="59d62765-66b3-448d-a2be-08953d376206" providerId="ADAL" clId="{B65B568B-9A63-4EAA-B562-9410F638B9BB}" dt="2023-08-31T08:18:17.790" v="32" actId="700"/>
+          <ac:spMkLst>
+            <pc:docMk/>
+            <pc:sldMk cId="3519303869" sldId="257"/>
+            <ac:spMk id="8" creationId="{BA77DE36-AFBC-42F6-8C6A-8CC525F19A62}"/>
+          </ac:spMkLst>
+        </pc:spChg>
+        <pc:spChg chg="add mod ord">
+          <ac:chgData name="Matt Proctor" userId="59d62765-66b3-448d-a2be-08953d376206" providerId="ADAL" clId="{B65B568B-9A63-4EAA-B562-9410F638B9BB}" dt="2023-08-31T08:18:17.790" v="32" actId="700"/>
+          <ac:spMkLst>
+            <pc:docMk/>
+            <pc:sldMk cId="3519303869" sldId="257"/>
+            <ac:spMk id="9" creationId="{2F2F2853-984D-37E9-E1E9-7F6E1E8E2761}"/>
+          </ac:spMkLst>
+        </pc:spChg>
+        <pc:spChg chg="add mod ord">
+          <ac:chgData name="Matt Proctor" userId="59d62765-66b3-448d-a2be-08953d376206" providerId="ADAL" clId="{B65B568B-9A63-4EAA-B562-9410F638B9BB}" dt="2023-08-31T08:18:17.790" v="32" actId="700"/>
+          <ac:spMkLst>
+            <pc:docMk/>
+            <pc:sldMk cId="3519303869" sldId="257"/>
+            <ac:spMk id="10" creationId="{93F63309-32CC-BA3F-0605-A8F365CD800D}"/>
           </ac:spMkLst>
         </pc:spChg>
       </pc:sldChg>
@@ -785,7 +943,7 @@
           <a:p>
             <a:fld id="{173DEA02-80BC-4B4A-88AA-63BCC9943E88}" type="datetime3">
               <a:rPr lang="en-US" smtClean="0"/>
-              <a:t>30 August 2023</a:t>
+              <a:t>31 August 2023</a:t>
             </a:fld>
             <a:endParaRPr lang="en-GB" dirty="0"/>
           </a:p>
@@ -5785,7 +5943,7 @@
           <a:p>
             <a:fld id="{173DEA02-80BC-4B4A-88AA-63BCC9943E88}" type="datetime3">
               <a:rPr lang="en-US" smtClean="0"/>
-              <a:t>30 August 2023</a:t>
+              <a:t>31 August 2023</a:t>
             </a:fld>
             <a:endParaRPr lang="en-GB" dirty="0"/>
           </a:p>
@@ -6070,7 +6228,7 @@
           <a:p>
             <a:fld id="{173DEA02-80BC-4B4A-88AA-63BCC9943E88}" type="datetime3">
               <a:rPr lang="en-US" smtClean="0"/>
-              <a:t>30 August 2023</a:t>
+              <a:t>31 August 2023</a:t>
             </a:fld>
             <a:endParaRPr lang="en-GB" dirty="0"/>
           </a:p>
@@ -7055,7 +7213,7 @@
           <a:p>
             <a:fld id="{173DEA02-80BC-4B4A-88AA-63BCC9943E88}" type="datetime3">
               <a:rPr lang="en-US" smtClean="0"/>
-              <a:t>30 August 2023</a:t>
+              <a:t>31 August 2023</a:t>
             </a:fld>
             <a:endParaRPr lang="en-GB" dirty="0"/>
           </a:p>
@@ -25942,7 +26100,7 @@
           <a:p>
             <a:fld id="{173DEA02-80BC-4B4A-88AA-63BCC9943E88}" type="datetime3">
               <a:rPr lang="en-US" smtClean="0"/>
-              <a:t>30 August 2023</a:t>
+              <a:t>31 August 2023</a:t>
             </a:fld>
             <a:endParaRPr lang="en-GB" dirty="0"/>
           </a:p>

</xml_diff>

<commit_message>
Doc Release Board Template Added under --docs
</commit_message>
<xml_diff>
--- a/template/_template.pptx
+++ b/template/_template.pptx
@@ -124,12 +124,20 @@
 </p:presentation>
 </file>
 
+<file path=ppt/revisionInfo.xml><?xml version="1.0" encoding="utf-8"?>
+<p1510:revInfo xmlns:a="http://schemas.openxmlformats.org/drawingml/2006/main" xmlns:r="http://schemas.openxmlformats.org/officeDocument/2006/relationships" xmlns:p1510="http://schemas.microsoft.com/office/powerpoint/2015/10/main">
+  <p1510:revLst>
+    <p1510:client id="{B65B568B-9A63-4EAA-B562-9410F638B9BB}" v="20" dt="2023-09-08T07:39:31.765"/>
+  </p1510:revLst>
+</p1510:revInfo>
+</file>
+
 <file path=ppt/changesInfos/changesInfo1.xml><?xml version="1.0" encoding="utf-8"?>
 <pc:chgInfo xmlns:a="http://schemas.openxmlformats.org/drawingml/2006/main" xmlns:r="http://schemas.openxmlformats.org/officeDocument/2006/relationships" xmlns:ac="http://schemas.microsoft.com/office/drawing/2013/main/command" xmlns:pc="http://schemas.microsoft.com/office/powerpoint/2013/main/command">
   <pc:docChgLst>
     <pc:chgData name="Matt Proctor" userId="59d62765-66b3-448d-a2be-08953d376206" providerId="ADAL" clId="{B65B568B-9A63-4EAA-B562-9410F638B9BB}"/>
     <pc:docChg chg="undo custSel addSld delSld modSld delMainMaster modMainMaster">
-      <pc:chgData name="Matt Proctor" userId="59d62765-66b3-448d-a2be-08953d376206" providerId="ADAL" clId="{B65B568B-9A63-4EAA-B562-9410F638B9BB}" dt="2023-08-31T08:40:16.615" v="39" actId="2696"/>
+      <pc:chgData name="Matt Proctor" userId="59d62765-66b3-448d-a2be-08953d376206" providerId="ADAL" clId="{B65B568B-9A63-4EAA-B562-9410F638B9BB}" dt="2023-09-08T07:40:01.723" v="131" actId="6014"/>
       <pc:docMkLst>
         <pc:docMk/>
       </pc:docMkLst>
@@ -409,6 +417,85 @@
         </pc:spChg>
       </pc:sldChg>
       <pc:sldChg chg="addSp delSp modSp new del mod modClrScheme chgLayout">
+        <pc:chgData name="Matt Proctor" userId="59d62765-66b3-448d-a2be-08953d376206" providerId="ADAL" clId="{B65B568B-9A63-4EAA-B562-9410F638B9BB}" dt="2023-09-08T07:39:40.581" v="129" actId="2696"/>
+        <pc:sldMkLst>
+          <pc:docMk/>
+          <pc:sldMk cId="3421115677" sldId="257"/>
+        </pc:sldMkLst>
+        <pc:spChg chg="del mod ord">
+          <ac:chgData name="Matt Proctor" userId="59d62765-66b3-448d-a2be-08953d376206" providerId="ADAL" clId="{B65B568B-9A63-4EAA-B562-9410F638B9BB}" dt="2023-09-08T07:38:50.402" v="81" actId="700"/>
+          <ac:spMkLst>
+            <pc:docMk/>
+            <pc:sldMk cId="3421115677" sldId="257"/>
+            <ac:spMk id="2" creationId="{6382F342-93BF-75E9-329E-5286686415EC}"/>
+          </ac:spMkLst>
+        </pc:spChg>
+        <pc:spChg chg="del mod ord">
+          <ac:chgData name="Matt Proctor" userId="59d62765-66b3-448d-a2be-08953d376206" providerId="ADAL" clId="{B65B568B-9A63-4EAA-B562-9410F638B9BB}" dt="2023-09-08T07:39:36.395" v="128" actId="478"/>
+          <ac:spMkLst>
+            <pc:docMk/>
+            <pc:sldMk cId="3421115677" sldId="257"/>
+            <ac:spMk id="3" creationId="{A4D3C424-547A-3E1D-017A-069EE3F04E8A}"/>
+          </ac:spMkLst>
+        </pc:spChg>
+        <pc:spChg chg="del mod ord">
+          <ac:chgData name="Matt Proctor" userId="59d62765-66b3-448d-a2be-08953d376206" providerId="ADAL" clId="{B65B568B-9A63-4EAA-B562-9410F638B9BB}" dt="2023-09-08T07:38:50.402" v="81" actId="700"/>
+          <ac:spMkLst>
+            <pc:docMk/>
+            <pc:sldMk cId="3421115677" sldId="257"/>
+            <ac:spMk id="4" creationId="{ED830B0F-7503-697C-263B-280D603F7CB9}"/>
+          </ac:spMkLst>
+        </pc:spChg>
+        <pc:spChg chg="add mod ord">
+          <ac:chgData name="Matt Proctor" userId="59d62765-66b3-448d-a2be-08953d376206" providerId="ADAL" clId="{B65B568B-9A63-4EAA-B562-9410F638B9BB}" dt="2023-09-08T07:39:31.765" v="127"/>
+          <ac:spMkLst>
+            <pc:docMk/>
+            <pc:sldMk cId="3421115677" sldId="257"/>
+            <ac:spMk id="5" creationId="{76A7BFDC-02B4-5466-E6CD-D979DCC31AA5}"/>
+          </ac:spMkLst>
+        </pc:spChg>
+        <pc:spChg chg="add mod ord">
+          <ac:chgData name="Matt Proctor" userId="59d62765-66b3-448d-a2be-08953d376206" providerId="ADAL" clId="{B65B568B-9A63-4EAA-B562-9410F638B9BB}" dt="2023-09-08T07:39:31.765" v="127"/>
+          <ac:spMkLst>
+            <pc:docMk/>
+            <pc:sldMk cId="3421115677" sldId="257"/>
+            <ac:spMk id="6" creationId="{8A68996B-1C6F-7ECA-7566-E2F2FDE7C469}"/>
+          </ac:spMkLst>
+        </pc:spChg>
+        <pc:spChg chg="add mod ord">
+          <ac:chgData name="Matt Proctor" userId="59d62765-66b3-448d-a2be-08953d376206" providerId="ADAL" clId="{B65B568B-9A63-4EAA-B562-9410F638B9BB}" dt="2023-09-08T07:39:31.765" v="127"/>
+          <ac:spMkLst>
+            <pc:docMk/>
+            <pc:sldMk cId="3421115677" sldId="257"/>
+            <ac:spMk id="7" creationId="{72460D2B-0219-E276-3A86-CAB7E6A08EED}"/>
+          </ac:spMkLst>
+        </pc:spChg>
+        <pc:spChg chg="add del mod">
+          <ac:chgData name="Matt Proctor" userId="59d62765-66b3-448d-a2be-08953d376206" providerId="ADAL" clId="{B65B568B-9A63-4EAA-B562-9410F638B9BB}" dt="2023-09-08T07:39:31.765" v="127"/>
+          <ac:spMkLst>
+            <pc:docMk/>
+            <pc:sldMk cId="3421115677" sldId="257"/>
+            <ac:spMk id="8" creationId="{5404D413-4162-2C33-1008-D1B5328C0228}"/>
+          </ac:spMkLst>
+        </pc:spChg>
+        <pc:spChg chg="add del mod">
+          <ac:chgData name="Matt Proctor" userId="59d62765-66b3-448d-a2be-08953d376206" providerId="ADAL" clId="{B65B568B-9A63-4EAA-B562-9410F638B9BB}" dt="2023-09-08T07:39:31.765" v="127"/>
+          <ac:spMkLst>
+            <pc:docMk/>
+            <pc:sldMk cId="3421115677" sldId="257"/>
+            <ac:spMk id="9" creationId="{5BFCC6DB-B044-9816-0389-5AAF742F91F3}"/>
+          </ac:spMkLst>
+        </pc:spChg>
+        <pc:spChg chg="add del mod">
+          <ac:chgData name="Matt Proctor" userId="59d62765-66b3-448d-a2be-08953d376206" providerId="ADAL" clId="{B65B568B-9A63-4EAA-B562-9410F638B9BB}" dt="2023-09-08T07:39:31.765" v="127"/>
+          <ac:spMkLst>
+            <pc:docMk/>
+            <pc:sldMk cId="3421115677" sldId="257"/>
+            <ac:spMk id="10" creationId="{558866A9-AA13-35D0-AB57-CE1100E00DBE}"/>
+          </ac:spMkLst>
+        </pc:spChg>
+      </pc:sldChg>
+      <pc:sldChg chg="addSp delSp modSp new del mod modClrScheme chgLayout">
         <pc:chgData name="Matt Proctor" userId="59d62765-66b3-448d-a2be-08953d376206" providerId="ADAL" clId="{B65B568B-9A63-4EAA-B562-9410F638B9BB}" dt="2023-08-31T08:29:50.658" v="35" actId="2696"/>
         <pc:sldMkLst>
           <pc:docMk/>
@@ -614,8 +701,8 @@
           </pc:sldLayoutMkLst>
         </pc:sldLayoutChg>
       </pc:sldMasterChg>
-      <pc:sldMasterChg chg="modSldLayout">
-        <pc:chgData name="Matt Proctor" userId="59d62765-66b3-448d-a2be-08953d376206" providerId="ADAL" clId="{B65B568B-9A63-4EAA-B562-9410F638B9BB}" dt="2023-08-23T09:44:49.664" v="27" actId="478"/>
+      <pc:sldMasterChg chg="addSldLayout modSldLayout">
+        <pc:chgData name="Matt Proctor" userId="59d62765-66b3-448d-a2be-08953d376206" providerId="ADAL" clId="{B65B568B-9A63-4EAA-B562-9410F638B9BB}" dt="2023-09-08T07:40:01.723" v="131" actId="6014"/>
         <pc:sldMasterMkLst>
           <pc:docMk/>
           <pc:sldMasterMk cId="2906934212" sldId="2147483845"/>
@@ -643,6 +730,67 @@
               <pc:sldMasterMk cId="2906934212" sldId="2147483845"/>
               <pc:sldLayoutMk cId="1294593767" sldId="2147483789"/>
               <ac:spMk id="4" creationId="{5735176D-77D3-BF97-65A5-601804D00554}"/>
+            </ac:spMkLst>
+          </pc:spChg>
+        </pc:sldLayoutChg>
+        <pc:sldLayoutChg chg="modSp mod">
+          <pc:chgData name="Matt Proctor" userId="59d62765-66b3-448d-a2be-08953d376206" providerId="ADAL" clId="{B65B568B-9A63-4EAA-B562-9410F638B9BB}" dt="2023-09-08T07:40:01.723" v="131" actId="6014"/>
+          <pc:sldLayoutMkLst>
+            <pc:docMk/>
+            <pc:sldMasterMk cId="2906934212" sldId="2147483845"/>
+            <pc:sldLayoutMk cId="334984900" sldId="2147483791"/>
+          </pc:sldLayoutMkLst>
+          <pc:spChg chg="mod">
+            <ac:chgData name="Matt Proctor" userId="59d62765-66b3-448d-a2be-08953d376206" providerId="ADAL" clId="{B65B568B-9A63-4EAA-B562-9410F638B9BB}" dt="2023-09-08T07:35:20.666" v="41" actId="1076"/>
+            <ac:spMkLst>
+              <pc:docMk/>
+              <pc:sldMasterMk cId="2906934212" sldId="2147483845"/>
+              <pc:sldLayoutMk cId="334984900" sldId="2147483791"/>
+              <ac:spMk id="43" creationId="{5FA72DD8-B99E-A745-BF03-9365086E8DD8}"/>
+            </ac:spMkLst>
+          </pc:spChg>
+        </pc:sldLayoutChg>
+        <pc:sldLayoutChg chg="addSp delSp modSp add mod replId modTransition">
+          <pc:chgData name="Matt Proctor" userId="59d62765-66b3-448d-a2be-08953d376206" providerId="ADAL" clId="{B65B568B-9A63-4EAA-B562-9410F638B9BB}" dt="2023-09-08T07:39:54.186" v="130" actId="6014"/>
+          <pc:sldLayoutMkLst>
+            <pc:docMk/>
+            <pc:sldMasterMk cId="2906934212" sldId="2147483845"/>
+            <pc:sldLayoutMk cId="799927414" sldId="2147483847"/>
+          </pc:sldLayoutMkLst>
+          <pc:spChg chg="add mod">
+            <ac:chgData name="Matt Proctor" userId="59d62765-66b3-448d-a2be-08953d376206" providerId="ADAL" clId="{B65B568B-9A63-4EAA-B562-9410F638B9BB}" dt="2023-09-08T07:38:16.898" v="77" actId="1076"/>
+            <ac:spMkLst>
+              <pc:docMk/>
+              <pc:sldMasterMk cId="2906934212" sldId="2147483845"/>
+              <pc:sldLayoutMk cId="799927414" sldId="2147483847"/>
+              <ac:spMk id="3" creationId="{2643FEFE-3849-7A20-2060-E3E383876731}"/>
+            </ac:spMkLst>
+          </pc:spChg>
+          <pc:spChg chg="mod">
+            <ac:chgData name="Matt Proctor" userId="59d62765-66b3-448d-a2be-08953d376206" providerId="ADAL" clId="{B65B568B-9A63-4EAA-B562-9410F638B9BB}" dt="2023-09-08T07:39:23.990" v="126" actId="1076"/>
+            <ac:spMkLst>
+              <pc:docMk/>
+              <pc:sldMasterMk cId="2906934212" sldId="2147483845"/>
+              <pc:sldLayoutMk cId="799927414" sldId="2147483847"/>
+              <ac:spMk id="15" creationId="{2EDE9BD7-1AD2-9841-98A3-F74D8FA2F013}"/>
+            </ac:spMkLst>
+          </pc:spChg>
+          <pc:spChg chg="del mod">
+            <ac:chgData name="Matt Proctor" userId="59d62765-66b3-448d-a2be-08953d376206" providerId="ADAL" clId="{B65B568B-9A63-4EAA-B562-9410F638B9BB}" dt="2023-09-08T07:35:37.086" v="45" actId="478"/>
+            <ac:spMkLst>
+              <pc:docMk/>
+              <pc:sldMasterMk cId="2906934212" sldId="2147483845"/>
+              <pc:sldLayoutMk cId="799927414" sldId="2147483847"/>
+              <ac:spMk id="43" creationId="{5FA72DD8-B99E-A745-BF03-9365086E8DD8}"/>
+            </ac:spMkLst>
+          </pc:spChg>
+          <pc:spChg chg="del">
+            <ac:chgData name="Matt Proctor" userId="59d62765-66b3-448d-a2be-08953d376206" providerId="ADAL" clId="{B65B568B-9A63-4EAA-B562-9410F638B9BB}" dt="2023-09-08T07:35:26.510" v="43" actId="478"/>
+            <ac:spMkLst>
+              <pc:docMk/>
+              <pc:sldMasterMk cId="2906934212" sldId="2147483845"/>
+              <pc:sldLayoutMk cId="799927414" sldId="2147483847"/>
+              <ac:spMk id="49" creationId="{BB11FB6A-B0FD-754E-B1CA-4572D1A409C0}"/>
             </ac:spMkLst>
           </pc:spChg>
         </pc:sldLayoutChg>
@@ -943,7 +1091,7 @@
           <a:p>
             <a:fld id="{173DEA02-80BC-4B4A-88AA-63BCC9943E88}" type="datetime3">
               <a:rPr lang="en-US" smtClean="0"/>
-              <a:t>31 August 2023</a:t>
+              <a:t>8 September 2023</a:t>
             </a:fld>
             <a:endParaRPr lang="en-GB" dirty="0"/>
           </a:p>
@@ -5943,7 +6091,7 @@
           <a:p>
             <a:fld id="{173DEA02-80BC-4B4A-88AA-63BCC9943E88}" type="datetime3">
               <a:rPr lang="en-US" smtClean="0"/>
-              <a:t>31 August 2023</a:t>
+              <a:t>8 September 2023</a:t>
             </a:fld>
             <a:endParaRPr lang="en-GB" dirty="0"/>
           </a:p>
@@ -6228,7 +6376,7 @@
           <a:p>
             <a:fld id="{173DEA02-80BC-4B4A-88AA-63BCC9943E88}" type="datetime3">
               <a:rPr lang="en-US" smtClean="0"/>
-              <a:t>31 August 2023</a:t>
+              <a:t>8 September 2023</a:t>
             </a:fld>
             <a:endParaRPr lang="en-GB" dirty="0"/>
           </a:p>
@@ -7213,7 +7361,7 @@
           <a:p>
             <a:fld id="{173DEA02-80BC-4B4A-88AA-63BCC9943E88}" type="datetime3">
               <a:rPr lang="en-US" smtClean="0"/>
-              <a:t>31 August 2023</a:t>
+              <a:t>8 September 2023</a:t>
             </a:fld>
             <a:endParaRPr lang="en-GB" dirty="0"/>
           </a:p>
@@ -7928,7 +8076,7 @@
 
 <file path=ppt/slideLayouts/slideLayout22.xml><?xml version="1.0" encoding="utf-8"?>
 <p:sldLayout xmlns:a="http://schemas.openxmlformats.org/drawingml/2006/main" xmlns:r="http://schemas.openxmlformats.org/officeDocument/2006/relationships" xmlns:p="http://schemas.openxmlformats.org/presentationml/2006/main" preserve="1" userDrawn="1">
-  <p:cSld name="1_3 COLUMN TEXT SLIDE">
+  <p:cSld name="Impacted_Teams">
     <p:bg>
       <p:bgPr>
         <a:solidFill>
@@ -8288,6 +8436,316 @@
 </file>
 
 <file path=ppt/slideLayouts/slideLayout23.xml><?xml version="1.0" encoding="utf-8"?>
+<p:sldLayout xmlns:a="http://schemas.openxmlformats.org/drawingml/2006/main" xmlns:r="http://schemas.openxmlformats.org/officeDocument/2006/relationships" xmlns:p="http://schemas.openxmlformats.org/presentationml/2006/main" preserve="1" userDrawn="1">
+  <p:cSld name="Document_Release_Board">
+    <p:bg>
+      <p:bgPr>
+        <a:solidFill>
+          <a:schemeClr val="bg1"/>
+        </a:solidFill>
+        <a:effectLst/>
+      </p:bgPr>
+    </p:bg>
+    <p:spTree>
+      <p:nvGrpSpPr>
+        <p:cNvPr id="1" name=""/>
+        <p:cNvGrpSpPr/>
+        <p:nvPr/>
+      </p:nvGrpSpPr>
+      <p:grpSpPr>
+        <a:xfrm>
+          <a:off x="0" y="0"/>
+          <a:ext cx="0" cy="0"/>
+          <a:chOff x="0" y="0"/>
+          <a:chExt cx="0" cy="0"/>
+        </a:xfrm>
+      </p:grpSpPr>
+      <p:sp>
+        <p:nvSpPr>
+          <p:cNvPr id="7" name="Slide Number Placeholder 25">
+            <a:extLst>
+              <a:ext uri="{FF2B5EF4-FFF2-40B4-BE49-F238E27FC236}">
+                <a16:creationId xmlns:a16="http://schemas.microsoft.com/office/drawing/2014/main" id="{93A9884C-110D-8D44-8CB3-7677ABC9541F}"/>
+              </a:ext>
+            </a:extLst>
+          </p:cNvPr>
+          <p:cNvSpPr txBox="1">
+            <a:spLocks/>
+          </p:cNvSpPr>
+          <p:nvPr/>
+        </p:nvSpPr>
+        <p:spPr>
+          <a:xfrm>
+            <a:off x="224132" y="6503745"/>
+            <a:ext cx="398073" cy="174101"/>
+          </a:xfrm>
+          <a:prstGeom prst="rect">
+            <a:avLst/>
+          </a:prstGeom>
+        </p:spPr>
+        <p:txBody>
+          <a:bodyPr vert="horz" lIns="0" tIns="0" rIns="0" bIns="0" rtlCol="0" anchor="ctr"/>
+          <a:lstStyle>
+            <a:defPPr>
+              <a:defRPr lang="en-US"/>
+            </a:defPPr>
+            <a:lvl1pPr marL="0" algn="l" defTabSz="914400" rtl="0" eaLnBrk="1" latinLnBrk="0" hangingPunct="1">
+              <a:defRPr sz="900" kern="1200">
+                <a:solidFill>
+                  <a:schemeClr val="tx1"/>
+                </a:solidFill>
+                <a:latin typeface="+mn-lt"/>
+                <a:ea typeface="+mn-ea"/>
+                <a:cs typeface="+mn-cs"/>
+              </a:defRPr>
+            </a:lvl1pPr>
+            <a:lvl2pPr marL="457200" algn="l" defTabSz="914400" rtl="0" eaLnBrk="1" latinLnBrk="0" hangingPunct="1">
+              <a:defRPr sz="1800" kern="1200">
+                <a:solidFill>
+                  <a:schemeClr val="tx1"/>
+                </a:solidFill>
+                <a:latin typeface="+mn-lt"/>
+                <a:ea typeface="+mn-ea"/>
+                <a:cs typeface="+mn-cs"/>
+              </a:defRPr>
+            </a:lvl2pPr>
+            <a:lvl3pPr marL="914400" algn="l" defTabSz="914400" rtl="0" eaLnBrk="1" latinLnBrk="0" hangingPunct="1">
+              <a:defRPr sz="1800" kern="1200">
+                <a:solidFill>
+                  <a:schemeClr val="tx1"/>
+                </a:solidFill>
+                <a:latin typeface="+mn-lt"/>
+                <a:ea typeface="+mn-ea"/>
+                <a:cs typeface="+mn-cs"/>
+              </a:defRPr>
+            </a:lvl3pPr>
+            <a:lvl4pPr marL="1371600" algn="l" defTabSz="914400" rtl="0" eaLnBrk="1" latinLnBrk="0" hangingPunct="1">
+              <a:defRPr sz="1800" kern="1200">
+                <a:solidFill>
+                  <a:schemeClr val="tx1"/>
+                </a:solidFill>
+                <a:latin typeface="+mn-lt"/>
+                <a:ea typeface="+mn-ea"/>
+                <a:cs typeface="+mn-cs"/>
+              </a:defRPr>
+            </a:lvl4pPr>
+            <a:lvl5pPr marL="1828800" algn="l" defTabSz="914400" rtl="0" eaLnBrk="1" latinLnBrk="0" hangingPunct="1">
+              <a:defRPr sz="1800" kern="1200">
+                <a:solidFill>
+                  <a:schemeClr val="tx1"/>
+                </a:solidFill>
+                <a:latin typeface="+mn-lt"/>
+                <a:ea typeface="+mn-ea"/>
+                <a:cs typeface="+mn-cs"/>
+              </a:defRPr>
+            </a:lvl5pPr>
+            <a:lvl6pPr marL="2286000" algn="l" defTabSz="914400" rtl="0" eaLnBrk="1" latinLnBrk="0" hangingPunct="1">
+              <a:defRPr sz="1800" kern="1200">
+                <a:solidFill>
+                  <a:schemeClr val="tx1"/>
+                </a:solidFill>
+                <a:latin typeface="+mn-lt"/>
+                <a:ea typeface="+mn-ea"/>
+                <a:cs typeface="+mn-cs"/>
+              </a:defRPr>
+            </a:lvl6pPr>
+            <a:lvl7pPr marL="2743200" algn="l" defTabSz="914400" rtl="0" eaLnBrk="1" latinLnBrk="0" hangingPunct="1">
+              <a:defRPr sz="1800" kern="1200">
+                <a:solidFill>
+                  <a:schemeClr val="tx1"/>
+                </a:solidFill>
+                <a:latin typeface="+mn-lt"/>
+                <a:ea typeface="+mn-ea"/>
+                <a:cs typeface="+mn-cs"/>
+              </a:defRPr>
+            </a:lvl7pPr>
+            <a:lvl8pPr marL="3200400" algn="l" defTabSz="914400" rtl="0" eaLnBrk="1" latinLnBrk="0" hangingPunct="1">
+              <a:defRPr sz="1800" kern="1200">
+                <a:solidFill>
+                  <a:schemeClr val="tx1"/>
+                </a:solidFill>
+                <a:latin typeface="+mn-lt"/>
+                <a:ea typeface="+mn-ea"/>
+                <a:cs typeface="+mn-cs"/>
+              </a:defRPr>
+            </a:lvl8pPr>
+            <a:lvl9pPr marL="3657600" algn="l" defTabSz="914400" rtl="0" eaLnBrk="1" latinLnBrk="0" hangingPunct="1">
+              <a:defRPr sz="1800" kern="1200">
+                <a:solidFill>
+                  <a:schemeClr val="tx1"/>
+                </a:solidFill>
+                <a:latin typeface="+mn-lt"/>
+                <a:ea typeface="+mn-ea"/>
+                <a:cs typeface="+mn-cs"/>
+              </a:defRPr>
+            </a:lvl9pPr>
+          </a:lstStyle>
+          <a:p>
+            <a:fld id="{0EAB5F6E-7727-EE48-B3FA-610FF2ED1CDA}" type="slidenum">
+              <a:rPr lang="en-GB" smtClean="0">
+                <a:solidFill>
+                  <a:schemeClr val="tx1"/>
+                </a:solidFill>
+              </a:rPr>
+              <a:pPr/>
+              <a:t>‹#›</a:t>
+            </a:fld>
+            <a:endParaRPr lang="en-GB" dirty="0">
+              <a:solidFill>
+                <a:schemeClr val="tx1"/>
+              </a:solidFill>
+            </a:endParaRPr>
+          </a:p>
+        </p:txBody>
+      </p:sp>
+      <p:sp>
+        <p:nvSpPr>
+          <p:cNvPr id="15" name="Text Placeholder 58">
+            <a:extLst>
+              <a:ext uri="{FF2B5EF4-FFF2-40B4-BE49-F238E27FC236}">
+                <a16:creationId xmlns:a16="http://schemas.microsoft.com/office/drawing/2014/main" id="{2EDE9BD7-1AD2-9841-98A3-F74D8FA2F013}"/>
+              </a:ext>
+            </a:extLst>
+          </p:cNvPr>
+          <p:cNvSpPr>
+            <a:spLocks noGrp="1"/>
+          </p:cNvSpPr>
+          <p:nvPr>
+            <p:ph type="body" sz="quarter" idx="27" hasCustomPrompt="1"/>
+          </p:nvPr>
+        </p:nvSpPr>
+        <p:spPr>
+          <a:xfrm>
+            <a:off x="223200" y="1011944"/>
+            <a:ext cx="11735438" cy="313650"/>
+          </a:xfrm>
+        </p:spPr>
+        <p:txBody>
+          <a:bodyPr/>
+          <a:lstStyle>
+            <a:lvl1pPr>
+              <a:lnSpc>
+                <a:spcPts val="2850"/>
+              </a:lnSpc>
+              <a:spcBef>
+                <a:spcPts val="0"/>
+              </a:spcBef>
+              <a:defRPr sz="2400" cap="all" baseline="0">
+                <a:latin typeface="Impact" panose="020B0806030902050204" pitchFamily="34" charset="0"/>
+              </a:defRPr>
+            </a:lvl1pPr>
+          </a:lstStyle>
+          <a:p>
+            <a:pPr lvl="0"/>
+            <a:r>
+              <a:rPr lang="en-US" dirty="0"/>
+              <a:t>Subtitle</a:t>
+            </a:r>
+            <a:endParaRPr lang="en-GB" dirty="0"/>
+          </a:p>
+        </p:txBody>
+      </p:sp>
+      <p:sp>
+        <p:nvSpPr>
+          <p:cNvPr id="2" name="Title 4">
+            <a:extLst>
+              <a:ext uri="{FF2B5EF4-FFF2-40B4-BE49-F238E27FC236}">
+                <a16:creationId xmlns:a16="http://schemas.microsoft.com/office/drawing/2014/main" id="{28CEAEF8-64B6-59E0-9DCB-3D773D5A005A}"/>
+              </a:ext>
+            </a:extLst>
+          </p:cNvPr>
+          <p:cNvSpPr>
+            <a:spLocks noGrp="1"/>
+          </p:cNvSpPr>
+          <p:nvPr>
+            <p:ph type="title" hasCustomPrompt="1"/>
+          </p:nvPr>
+        </p:nvSpPr>
+        <p:spPr>
+          <a:xfrm>
+            <a:off x="222578" y="216747"/>
+            <a:ext cx="11736060" cy="495430"/>
+          </a:xfrm>
+        </p:spPr>
+        <p:txBody>
+          <a:bodyPr/>
+          <a:lstStyle>
+            <a:lvl1pPr>
+              <a:lnSpc>
+                <a:spcPts val="3900"/>
+              </a:lnSpc>
+              <a:defRPr sz="3800">
+                <a:solidFill>
+                  <a:schemeClr val="tx1"/>
+                </a:solidFill>
+              </a:defRPr>
+            </a:lvl1pPr>
+          </a:lstStyle>
+          <a:p>
+            <a:r>
+              <a:rPr lang="en-GB" noProof="0" dirty="0"/>
+              <a:t>Page title </a:t>
+            </a:r>
+          </a:p>
+        </p:txBody>
+      </p:sp>
+      <p:sp>
+        <p:nvSpPr>
+          <p:cNvPr id="3" name="Text Placeholder 58">
+            <a:extLst>
+              <a:ext uri="{FF2B5EF4-FFF2-40B4-BE49-F238E27FC236}">
+                <a16:creationId xmlns:a16="http://schemas.microsoft.com/office/drawing/2014/main" id="{2643FEFE-3849-7A20-2060-E3E383876731}"/>
+              </a:ext>
+            </a:extLst>
+          </p:cNvPr>
+          <p:cNvSpPr>
+            <a:spLocks noGrp="1"/>
+          </p:cNvSpPr>
+          <p:nvPr>
+            <p:ph type="body" sz="quarter" idx="28"/>
+          </p:nvPr>
+        </p:nvSpPr>
+        <p:spPr>
+          <a:xfrm>
+            <a:off x="223200" y="738000"/>
+            <a:ext cx="11736000" cy="165600"/>
+          </a:xfrm>
+        </p:spPr>
+        <p:txBody>
+          <a:bodyPr/>
+          <a:lstStyle>
+            <a:lvl1pPr>
+              <a:lnSpc>
+                <a:spcPct val="100000"/>
+              </a:lnSpc>
+              <a:spcBef>
+                <a:spcPts val="0"/>
+              </a:spcBef>
+              <a:defRPr sz="1550" b="1" cap="none" baseline="0">
+                <a:latin typeface="+mn-lt"/>
+              </a:defRPr>
+            </a:lvl1pPr>
+          </a:lstStyle>
+          <a:p>
+            <a:pPr lvl="0"/>
+            <a:endParaRPr lang="en-GB" dirty="0"/>
+          </a:p>
+        </p:txBody>
+      </p:sp>
+    </p:spTree>
+    <p:extLst>
+      <p:ext uri="{BB962C8B-B14F-4D97-AF65-F5344CB8AC3E}">
+        <p14:creationId xmlns:p14="http://schemas.microsoft.com/office/powerpoint/2010/main" val="799927414"/>
+      </p:ext>
+    </p:extLst>
+  </p:cSld>
+  <p:clrMapOvr>
+    <a:masterClrMapping/>
+  </p:clrMapOvr>
+</p:sldLayout>
+</file>
+
+<file path=ppt/slideLayouts/slideLayout24.xml><?xml version="1.0" encoding="utf-8"?>
 <p:sldLayout xmlns:a="http://schemas.openxmlformats.org/drawingml/2006/main" xmlns:r="http://schemas.openxmlformats.org/officeDocument/2006/relationships" xmlns:p="http://schemas.openxmlformats.org/presentationml/2006/main" preserve="1">
   <p:cSld name="1_2 COLUMN TEXT SLIDE">
     <p:bg>
@@ -9500,7 +9958,7 @@
 </p:sldLayout>
 </file>
 
-<file path=ppt/slideLayouts/slideLayout24.xml><?xml version="1.0" encoding="utf-8"?>
+<file path=ppt/slideLayouts/slideLayout25.xml><?xml version="1.0" encoding="utf-8"?>
 <p:sldLayout xmlns:a="http://schemas.openxmlformats.org/drawingml/2006/main" xmlns:r="http://schemas.openxmlformats.org/officeDocument/2006/relationships" xmlns:p="http://schemas.openxmlformats.org/presentationml/2006/main" preserve="1">
   <p:cSld name="1_4 COLUMN TEXT SLIDE">
     <p:bg>
@@ -11391,7 +11849,7 @@
 </p:sldLayout>
 </file>
 
-<file path=ppt/slideLayouts/slideLayout25.xml><?xml version="1.0" encoding="utf-8"?>
+<file path=ppt/slideLayouts/slideLayout26.xml><?xml version="1.0" encoding="utf-8"?>
 <p:sldLayout xmlns:a="http://schemas.openxmlformats.org/drawingml/2006/main" xmlns:r="http://schemas.openxmlformats.org/officeDocument/2006/relationships" xmlns:p="http://schemas.openxmlformats.org/presentationml/2006/main" preserve="1">
   <p:cSld name="2_CHART SLIDE – SHORT TITLE">
     <p:bg>
@@ -11874,7 +12332,7 @@
 </p:sldLayout>
 </file>
 
-<file path=ppt/slideLayouts/slideLayout26.xml><?xml version="1.0" encoding="utf-8"?>
+<file path=ppt/slideLayouts/slideLayout27.xml><?xml version="1.0" encoding="utf-8"?>
 <p:sldLayout xmlns:a="http://schemas.openxmlformats.org/drawingml/2006/main" xmlns:r="http://schemas.openxmlformats.org/officeDocument/2006/relationships" xmlns:p="http://schemas.openxmlformats.org/presentationml/2006/main" showMasterSp="0" preserve="1">
   <p:cSld name="Leer">
     <p:spTree>
@@ -12042,7 +12500,7 @@
 </p:sldLayout>
 </file>
 
-<file path=ppt/slideLayouts/slideLayout27.xml><?xml version="1.0" encoding="utf-8"?>
+<file path=ppt/slideLayouts/slideLayout28.xml><?xml version="1.0" encoding="utf-8"?>
 <p:sldLayout xmlns:a="http://schemas.openxmlformats.org/drawingml/2006/main" xmlns:r="http://schemas.openxmlformats.org/officeDocument/2006/relationships" xmlns:p="http://schemas.openxmlformats.org/presentationml/2006/main" showMasterSp="0" preserve="1">
   <p:cSld name="3_CONTENT SLIDE 01 – BLUE/PURPLE">
     <p:bg>
@@ -13561,7 +14019,7 @@
 </p:sldLayout>
 </file>
 
-<file path=ppt/slideLayouts/slideLayout28.xml><?xml version="1.0" encoding="utf-8"?>
+<file path=ppt/slideLayouts/slideLayout29.xml><?xml version="1.0" encoding="utf-8"?>
 <p:sldLayout xmlns:a="http://schemas.openxmlformats.org/drawingml/2006/main" xmlns:r="http://schemas.openxmlformats.org/officeDocument/2006/relationships" xmlns:p="http://schemas.openxmlformats.org/presentationml/2006/main" showMasterSp="0" preserve="1">
   <p:cSld name="2_CONTENT SLIDE 01 – BLUE/PURPLE">
     <p:bg>
@@ -14786,7 +15244,299 @@
 </p:sldLayout>
 </file>
 
-<file path=ppt/slideLayouts/slideLayout29.xml><?xml version="1.0" encoding="utf-8"?>
+<file path=ppt/slideLayouts/slideLayout3.xml><?xml version="1.0" encoding="utf-8"?>
+<p:sldLayout xmlns:a="http://schemas.openxmlformats.org/drawingml/2006/main" xmlns:r="http://schemas.openxmlformats.org/officeDocument/2006/relationships" xmlns:p="http://schemas.openxmlformats.org/presentationml/2006/main" showMasterSp="0" preserve="1">
+  <p:cSld name="3_DIVIDER SLIDE – BLUE/PURPLE">
+    <p:bg>
+      <p:bgPr>
+        <a:solidFill>
+          <a:schemeClr val="accent1"/>
+        </a:solidFill>
+        <a:effectLst/>
+      </p:bgPr>
+    </p:bg>
+    <p:spTree>
+      <p:nvGrpSpPr>
+        <p:cNvPr id="1" name=""/>
+        <p:cNvGrpSpPr/>
+        <p:nvPr/>
+      </p:nvGrpSpPr>
+      <p:grpSpPr>
+        <a:xfrm>
+          <a:off x="0" y="0"/>
+          <a:ext cx="0" cy="0"/>
+          <a:chOff x="0" y="0"/>
+          <a:chExt cx="0" cy="0"/>
+        </a:xfrm>
+      </p:grpSpPr>
+      <p:pic>
+        <p:nvPicPr>
+          <p:cNvPr id="6" name="Picture 5" descr="Diagram, venn diagram&#10;&#10;Description automatically generated">
+            <a:extLst>
+              <a:ext uri="{FF2B5EF4-FFF2-40B4-BE49-F238E27FC236}">
+                <a16:creationId xmlns:a16="http://schemas.microsoft.com/office/drawing/2014/main" id="{8D8E8734-7D73-5870-3151-A2C3254D9F3B}"/>
+              </a:ext>
+            </a:extLst>
+          </p:cNvPr>
+          <p:cNvPicPr>
+            <a:picLocks noChangeAspect="1"/>
+          </p:cNvPicPr>
+          <p:nvPr/>
+        </p:nvPicPr>
+        <p:blipFill>
+          <a:blip r:embed="rId2"/>
+          <a:stretch>
+            <a:fillRect/>
+          </a:stretch>
+        </p:blipFill>
+        <p:spPr>
+          <a:xfrm>
+            <a:off x="0" y="0"/>
+            <a:ext cx="12192000" cy="6860330"/>
+          </a:xfrm>
+          <a:prstGeom prst="rect">
+            <a:avLst/>
+          </a:prstGeom>
+        </p:spPr>
+      </p:pic>
+      <p:sp>
+        <p:nvSpPr>
+          <p:cNvPr id="7" name="Slide Number Placeholder 25">
+            <a:extLst>
+              <a:ext uri="{FF2B5EF4-FFF2-40B4-BE49-F238E27FC236}">
+                <a16:creationId xmlns:a16="http://schemas.microsoft.com/office/drawing/2014/main" id="{93A9884C-110D-8D44-8CB3-7677ABC9541F}"/>
+              </a:ext>
+            </a:extLst>
+          </p:cNvPr>
+          <p:cNvSpPr txBox="1">
+            <a:spLocks/>
+          </p:cNvSpPr>
+          <p:nvPr/>
+        </p:nvSpPr>
+        <p:spPr>
+          <a:xfrm>
+            <a:off x="224132" y="6503745"/>
+            <a:ext cx="398073" cy="174101"/>
+          </a:xfrm>
+          <a:prstGeom prst="rect">
+            <a:avLst/>
+          </a:prstGeom>
+        </p:spPr>
+        <p:txBody>
+          <a:bodyPr vert="horz" lIns="0" tIns="0" rIns="0" bIns="0" rtlCol="0" anchor="ctr"/>
+          <a:lstStyle>
+            <a:defPPr>
+              <a:defRPr lang="en-US"/>
+            </a:defPPr>
+            <a:lvl1pPr marL="0" algn="l" defTabSz="914400" rtl="0" eaLnBrk="1" latinLnBrk="0" hangingPunct="1">
+              <a:defRPr sz="900" kern="1200">
+                <a:solidFill>
+                  <a:schemeClr val="tx1"/>
+                </a:solidFill>
+                <a:latin typeface="+mn-lt"/>
+                <a:ea typeface="+mn-ea"/>
+                <a:cs typeface="+mn-cs"/>
+              </a:defRPr>
+            </a:lvl1pPr>
+            <a:lvl2pPr marL="457200" algn="l" defTabSz="914400" rtl="0" eaLnBrk="1" latinLnBrk="0" hangingPunct="1">
+              <a:defRPr sz="1800" kern="1200">
+                <a:solidFill>
+                  <a:schemeClr val="tx1"/>
+                </a:solidFill>
+                <a:latin typeface="+mn-lt"/>
+                <a:ea typeface="+mn-ea"/>
+                <a:cs typeface="+mn-cs"/>
+              </a:defRPr>
+            </a:lvl2pPr>
+            <a:lvl3pPr marL="914400" algn="l" defTabSz="914400" rtl="0" eaLnBrk="1" latinLnBrk="0" hangingPunct="1">
+              <a:defRPr sz="1800" kern="1200">
+                <a:solidFill>
+                  <a:schemeClr val="tx1"/>
+                </a:solidFill>
+                <a:latin typeface="+mn-lt"/>
+                <a:ea typeface="+mn-ea"/>
+                <a:cs typeface="+mn-cs"/>
+              </a:defRPr>
+            </a:lvl3pPr>
+            <a:lvl4pPr marL="1371600" algn="l" defTabSz="914400" rtl="0" eaLnBrk="1" latinLnBrk="0" hangingPunct="1">
+              <a:defRPr sz="1800" kern="1200">
+                <a:solidFill>
+                  <a:schemeClr val="tx1"/>
+                </a:solidFill>
+                <a:latin typeface="+mn-lt"/>
+                <a:ea typeface="+mn-ea"/>
+                <a:cs typeface="+mn-cs"/>
+              </a:defRPr>
+            </a:lvl4pPr>
+            <a:lvl5pPr marL="1828800" algn="l" defTabSz="914400" rtl="0" eaLnBrk="1" latinLnBrk="0" hangingPunct="1">
+              <a:defRPr sz="1800" kern="1200">
+                <a:solidFill>
+                  <a:schemeClr val="tx1"/>
+                </a:solidFill>
+                <a:latin typeface="+mn-lt"/>
+                <a:ea typeface="+mn-ea"/>
+                <a:cs typeface="+mn-cs"/>
+              </a:defRPr>
+            </a:lvl5pPr>
+            <a:lvl6pPr marL="2286000" algn="l" defTabSz="914400" rtl="0" eaLnBrk="1" latinLnBrk="0" hangingPunct="1">
+              <a:defRPr sz="1800" kern="1200">
+                <a:solidFill>
+                  <a:schemeClr val="tx1"/>
+                </a:solidFill>
+                <a:latin typeface="+mn-lt"/>
+                <a:ea typeface="+mn-ea"/>
+                <a:cs typeface="+mn-cs"/>
+              </a:defRPr>
+            </a:lvl6pPr>
+            <a:lvl7pPr marL="2743200" algn="l" defTabSz="914400" rtl="0" eaLnBrk="1" latinLnBrk="0" hangingPunct="1">
+              <a:defRPr sz="1800" kern="1200">
+                <a:solidFill>
+                  <a:schemeClr val="tx1"/>
+                </a:solidFill>
+                <a:latin typeface="+mn-lt"/>
+                <a:ea typeface="+mn-ea"/>
+                <a:cs typeface="+mn-cs"/>
+              </a:defRPr>
+            </a:lvl7pPr>
+            <a:lvl8pPr marL="3200400" algn="l" defTabSz="914400" rtl="0" eaLnBrk="1" latinLnBrk="0" hangingPunct="1">
+              <a:defRPr sz="1800" kern="1200">
+                <a:solidFill>
+                  <a:schemeClr val="tx1"/>
+                </a:solidFill>
+                <a:latin typeface="+mn-lt"/>
+                <a:ea typeface="+mn-ea"/>
+                <a:cs typeface="+mn-cs"/>
+              </a:defRPr>
+            </a:lvl8pPr>
+            <a:lvl9pPr marL="3657600" algn="l" defTabSz="914400" rtl="0" eaLnBrk="1" latinLnBrk="0" hangingPunct="1">
+              <a:defRPr sz="1800" kern="1200">
+                <a:solidFill>
+                  <a:schemeClr val="tx1"/>
+                </a:solidFill>
+                <a:latin typeface="+mn-lt"/>
+                <a:ea typeface="+mn-ea"/>
+                <a:cs typeface="+mn-cs"/>
+              </a:defRPr>
+            </a:lvl9pPr>
+          </a:lstStyle>
+          <a:p>
+            <a:fld id="{0EAB5F6E-7727-EE48-B3FA-610FF2ED1CDA}" type="slidenum">
+              <a:rPr lang="en-GB" smtClean="0">
+                <a:solidFill>
+                  <a:schemeClr val="bg1"/>
+                </a:solidFill>
+              </a:rPr>
+              <a:pPr/>
+              <a:t>‹#›</a:t>
+            </a:fld>
+            <a:endParaRPr lang="en-GB" dirty="0">
+              <a:solidFill>
+                <a:schemeClr val="bg1"/>
+              </a:solidFill>
+            </a:endParaRPr>
+          </a:p>
+        </p:txBody>
+      </p:sp>
+      <p:sp>
+        <p:nvSpPr>
+          <p:cNvPr id="5" name="Title 4">
+            <a:extLst>
+              <a:ext uri="{FF2B5EF4-FFF2-40B4-BE49-F238E27FC236}">
+                <a16:creationId xmlns:a16="http://schemas.microsoft.com/office/drawing/2014/main" id="{BC2698EC-1F08-7542-9232-487F38ECA1A1}"/>
+              </a:ext>
+            </a:extLst>
+          </p:cNvPr>
+          <p:cNvSpPr>
+            <a:spLocks noGrp="1"/>
+          </p:cNvSpPr>
+          <p:nvPr>
+            <p:ph type="title" hasCustomPrompt="1"/>
+          </p:nvPr>
+        </p:nvSpPr>
+        <p:spPr>
+          <a:xfrm>
+            <a:off x="223200" y="205200"/>
+            <a:ext cx="11736000" cy="2165056"/>
+          </a:xfrm>
+        </p:spPr>
+        <p:txBody>
+          <a:bodyPr/>
+          <a:lstStyle>
+            <a:lvl1pPr>
+              <a:lnSpc>
+                <a:spcPts val="9200"/>
+              </a:lnSpc>
+              <a:defRPr sz="9000">
+                <a:solidFill>
+                  <a:schemeClr val="bg1"/>
+                </a:solidFill>
+              </a:defRPr>
+            </a:lvl1pPr>
+          </a:lstStyle>
+          <a:p>
+            <a:r>
+              <a:rPr lang="en-GB" noProof="0" dirty="0"/>
+              <a:t>Divider slide</a:t>
+            </a:r>
+            <a:br>
+              <a:rPr lang="en-GB" noProof="0" dirty="0"/>
+            </a:br>
+            <a:r>
+              <a:rPr lang="en-GB" noProof="0" dirty="0"/>
+              <a:t>lorem ipsum </a:t>
+            </a:r>
+            <a:r>
+              <a:rPr lang="en-GB" noProof="0" dirty="0" err="1"/>
+              <a:t>uptir</a:t>
+            </a:r>
+            <a:endParaRPr lang="en-GB" noProof="0" dirty="0"/>
+          </a:p>
+        </p:txBody>
+      </p:sp>
+      <p:pic>
+        <p:nvPicPr>
+          <p:cNvPr id="4" name="Picture 3" descr="A picture containing text, clipart&#10;&#10;Description automatically generated">
+            <a:extLst>
+              <a:ext uri="{FF2B5EF4-FFF2-40B4-BE49-F238E27FC236}">
+                <a16:creationId xmlns:a16="http://schemas.microsoft.com/office/drawing/2014/main" id="{31E41DA4-A6FA-BA3D-ED80-DA8059C74055}"/>
+              </a:ext>
+            </a:extLst>
+          </p:cNvPr>
+          <p:cNvPicPr>
+            <a:picLocks noChangeAspect="1"/>
+          </p:cNvPicPr>
+          <p:nvPr/>
+        </p:nvPicPr>
+        <p:blipFill>
+          <a:blip r:embed="rId3"/>
+          <a:stretch>
+            <a:fillRect/>
+          </a:stretch>
+        </p:blipFill>
+        <p:spPr>
+          <a:xfrm>
+            <a:off x="10627162" y="6245846"/>
+            <a:ext cx="1330560" cy="432000"/>
+          </a:xfrm>
+          <a:prstGeom prst="rect">
+            <a:avLst/>
+          </a:prstGeom>
+        </p:spPr>
+      </p:pic>
+    </p:spTree>
+    <p:extLst>
+      <p:ext uri="{BB962C8B-B14F-4D97-AF65-F5344CB8AC3E}">
+        <p14:creationId xmlns:p14="http://schemas.microsoft.com/office/powerpoint/2010/main" val="2829569700"/>
+      </p:ext>
+    </p:extLst>
+  </p:cSld>
+  <p:clrMapOvr>
+    <a:masterClrMapping/>
+  </p:clrMapOvr>
+</p:sldLayout>
+</file>
+
+<file path=ppt/slideLayouts/slideLayout30.xml><?xml version="1.0" encoding="utf-8"?>
 <p:sldLayout xmlns:a="http://schemas.openxmlformats.org/drawingml/2006/main" xmlns:r="http://schemas.openxmlformats.org/officeDocument/2006/relationships" xmlns:p="http://schemas.openxmlformats.org/presentationml/2006/main" showMasterSp="0" preserve="1">
   <p:cSld name="CONTENT SLIDE 02 – BLUE/PURPLE">
     <p:bg>
@@ -16232,299 +16982,7 @@
 </p:sldLayout>
 </file>
 
-<file path=ppt/slideLayouts/slideLayout3.xml><?xml version="1.0" encoding="utf-8"?>
-<p:sldLayout xmlns:a="http://schemas.openxmlformats.org/drawingml/2006/main" xmlns:r="http://schemas.openxmlformats.org/officeDocument/2006/relationships" xmlns:p="http://schemas.openxmlformats.org/presentationml/2006/main" showMasterSp="0" preserve="1">
-  <p:cSld name="3_DIVIDER SLIDE – BLUE/PURPLE">
-    <p:bg>
-      <p:bgPr>
-        <a:solidFill>
-          <a:schemeClr val="accent1"/>
-        </a:solidFill>
-        <a:effectLst/>
-      </p:bgPr>
-    </p:bg>
-    <p:spTree>
-      <p:nvGrpSpPr>
-        <p:cNvPr id="1" name=""/>
-        <p:cNvGrpSpPr/>
-        <p:nvPr/>
-      </p:nvGrpSpPr>
-      <p:grpSpPr>
-        <a:xfrm>
-          <a:off x="0" y="0"/>
-          <a:ext cx="0" cy="0"/>
-          <a:chOff x="0" y="0"/>
-          <a:chExt cx="0" cy="0"/>
-        </a:xfrm>
-      </p:grpSpPr>
-      <p:pic>
-        <p:nvPicPr>
-          <p:cNvPr id="6" name="Picture 5" descr="Diagram, venn diagram&#10;&#10;Description automatically generated">
-            <a:extLst>
-              <a:ext uri="{FF2B5EF4-FFF2-40B4-BE49-F238E27FC236}">
-                <a16:creationId xmlns:a16="http://schemas.microsoft.com/office/drawing/2014/main" id="{8D8E8734-7D73-5870-3151-A2C3254D9F3B}"/>
-              </a:ext>
-            </a:extLst>
-          </p:cNvPr>
-          <p:cNvPicPr>
-            <a:picLocks noChangeAspect="1"/>
-          </p:cNvPicPr>
-          <p:nvPr/>
-        </p:nvPicPr>
-        <p:blipFill>
-          <a:blip r:embed="rId2"/>
-          <a:stretch>
-            <a:fillRect/>
-          </a:stretch>
-        </p:blipFill>
-        <p:spPr>
-          <a:xfrm>
-            <a:off x="0" y="0"/>
-            <a:ext cx="12192000" cy="6860330"/>
-          </a:xfrm>
-          <a:prstGeom prst="rect">
-            <a:avLst/>
-          </a:prstGeom>
-        </p:spPr>
-      </p:pic>
-      <p:sp>
-        <p:nvSpPr>
-          <p:cNvPr id="7" name="Slide Number Placeholder 25">
-            <a:extLst>
-              <a:ext uri="{FF2B5EF4-FFF2-40B4-BE49-F238E27FC236}">
-                <a16:creationId xmlns:a16="http://schemas.microsoft.com/office/drawing/2014/main" id="{93A9884C-110D-8D44-8CB3-7677ABC9541F}"/>
-              </a:ext>
-            </a:extLst>
-          </p:cNvPr>
-          <p:cNvSpPr txBox="1">
-            <a:spLocks/>
-          </p:cNvSpPr>
-          <p:nvPr/>
-        </p:nvSpPr>
-        <p:spPr>
-          <a:xfrm>
-            <a:off x="224132" y="6503745"/>
-            <a:ext cx="398073" cy="174101"/>
-          </a:xfrm>
-          <a:prstGeom prst="rect">
-            <a:avLst/>
-          </a:prstGeom>
-        </p:spPr>
-        <p:txBody>
-          <a:bodyPr vert="horz" lIns="0" tIns="0" rIns="0" bIns="0" rtlCol="0" anchor="ctr"/>
-          <a:lstStyle>
-            <a:defPPr>
-              <a:defRPr lang="en-US"/>
-            </a:defPPr>
-            <a:lvl1pPr marL="0" algn="l" defTabSz="914400" rtl="0" eaLnBrk="1" latinLnBrk="0" hangingPunct="1">
-              <a:defRPr sz="900" kern="1200">
-                <a:solidFill>
-                  <a:schemeClr val="tx1"/>
-                </a:solidFill>
-                <a:latin typeface="+mn-lt"/>
-                <a:ea typeface="+mn-ea"/>
-                <a:cs typeface="+mn-cs"/>
-              </a:defRPr>
-            </a:lvl1pPr>
-            <a:lvl2pPr marL="457200" algn="l" defTabSz="914400" rtl="0" eaLnBrk="1" latinLnBrk="0" hangingPunct="1">
-              <a:defRPr sz="1800" kern="1200">
-                <a:solidFill>
-                  <a:schemeClr val="tx1"/>
-                </a:solidFill>
-                <a:latin typeface="+mn-lt"/>
-                <a:ea typeface="+mn-ea"/>
-                <a:cs typeface="+mn-cs"/>
-              </a:defRPr>
-            </a:lvl2pPr>
-            <a:lvl3pPr marL="914400" algn="l" defTabSz="914400" rtl="0" eaLnBrk="1" latinLnBrk="0" hangingPunct="1">
-              <a:defRPr sz="1800" kern="1200">
-                <a:solidFill>
-                  <a:schemeClr val="tx1"/>
-                </a:solidFill>
-                <a:latin typeface="+mn-lt"/>
-                <a:ea typeface="+mn-ea"/>
-                <a:cs typeface="+mn-cs"/>
-              </a:defRPr>
-            </a:lvl3pPr>
-            <a:lvl4pPr marL="1371600" algn="l" defTabSz="914400" rtl="0" eaLnBrk="1" latinLnBrk="0" hangingPunct="1">
-              <a:defRPr sz="1800" kern="1200">
-                <a:solidFill>
-                  <a:schemeClr val="tx1"/>
-                </a:solidFill>
-                <a:latin typeface="+mn-lt"/>
-                <a:ea typeface="+mn-ea"/>
-                <a:cs typeface="+mn-cs"/>
-              </a:defRPr>
-            </a:lvl4pPr>
-            <a:lvl5pPr marL="1828800" algn="l" defTabSz="914400" rtl="0" eaLnBrk="1" latinLnBrk="0" hangingPunct="1">
-              <a:defRPr sz="1800" kern="1200">
-                <a:solidFill>
-                  <a:schemeClr val="tx1"/>
-                </a:solidFill>
-                <a:latin typeface="+mn-lt"/>
-                <a:ea typeface="+mn-ea"/>
-                <a:cs typeface="+mn-cs"/>
-              </a:defRPr>
-            </a:lvl5pPr>
-            <a:lvl6pPr marL="2286000" algn="l" defTabSz="914400" rtl="0" eaLnBrk="1" latinLnBrk="0" hangingPunct="1">
-              <a:defRPr sz="1800" kern="1200">
-                <a:solidFill>
-                  <a:schemeClr val="tx1"/>
-                </a:solidFill>
-                <a:latin typeface="+mn-lt"/>
-                <a:ea typeface="+mn-ea"/>
-                <a:cs typeface="+mn-cs"/>
-              </a:defRPr>
-            </a:lvl6pPr>
-            <a:lvl7pPr marL="2743200" algn="l" defTabSz="914400" rtl="0" eaLnBrk="1" latinLnBrk="0" hangingPunct="1">
-              <a:defRPr sz="1800" kern="1200">
-                <a:solidFill>
-                  <a:schemeClr val="tx1"/>
-                </a:solidFill>
-                <a:latin typeface="+mn-lt"/>
-                <a:ea typeface="+mn-ea"/>
-                <a:cs typeface="+mn-cs"/>
-              </a:defRPr>
-            </a:lvl7pPr>
-            <a:lvl8pPr marL="3200400" algn="l" defTabSz="914400" rtl="0" eaLnBrk="1" latinLnBrk="0" hangingPunct="1">
-              <a:defRPr sz="1800" kern="1200">
-                <a:solidFill>
-                  <a:schemeClr val="tx1"/>
-                </a:solidFill>
-                <a:latin typeface="+mn-lt"/>
-                <a:ea typeface="+mn-ea"/>
-                <a:cs typeface="+mn-cs"/>
-              </a:defRPr>
-            </a:lvl8pPr>
-            <a:lvl9pPr marL="3657600" algn="l" defTabSz="914400" rtl="0" eaLnBrk="1" latinLnBrk="0" hangingPunct="1">
-              <a:defRPr sz="1800" kern="1200">
-                <a:solidFill>
-                  <a:schemeClr val="tx1"/>
-                </a:solidFill>
-                <a:latin typeface="+mn-lt"/>
-                <a:ea typeface="+mn-ea"/>
-                <a:cs typeface="+mn-cs"/>
-              </a:defRPr>
-            </a:lvl9pPr>
-          </a:lstStyle>
-          <a:p>
-            <a:fld id="{0EAB5F6E-7727-EE48-B3FA-610FF2ED1CDA}" type="slidenum">
-              <a:rPr lang="en-GB" smtClean="0">
-                <a:solidFill>
-                  <a:schemeClr val="bg1"/>
-                </a:solidFill>
-              </a:rPr>
-              <a:pPr/>
-              <a:t>‹#›</a:t>
-            </a:fld>
-            <a:endParaRPr lang="en-GB" dirty="0">
-              <a:solidFill>
-                <a:schemeClr val="bg1"/>
-              </a:solidFill>
-            </a:endParaRPr>
-          </a:p>
-        </p:txBody>
-      </p:sp>
-      <p:sp>
-        <p:nvSpPr>
-          <p:cNvPr id="5" name="Title 4">
-            <a:extLst>
-              <a:ext uri="{FF2B5EF4-FFF2-40B4-BE49-F238E27FC236}">
-                <a16:creationId xmlns:a16="http://schemas.microsoft.com/office/drawing/2014/main" id="{BC2698EC-1F08-7542-9232-487F38ECA1A1}"/>
-              </a:ext>
-            </a:extLst>
-          </p:cNvPr>
-          <p:cNvSpPr>
-            <a:spLocks noGrp="1"/>
-          </p:cNvSpPr>
-          <p:nvPr>
-            <p:ph type="title" hasCustomPrompt="1"/>
-          </p:nvPr>
-        </p:nvSpPr>
-        <p:spPr>
-          <a:xfrm>
-            <a:off x="223200" y="205200"/>
-            <a:ext cx="11736000" cy="2165056"/>
-          </a:xfrm>
-        </p:spPr>
-        <p:txBody>
-          <a:bodyPr/>
-          <a:lstStyle>
-            <a:lvl1pPr>
-              <a:lnSpc>
-                <a:spcPts val="9200"/>
-              </a:lnSpc>
-              <a:defRPr sz="9000">
-                <a:solidFill>
-                  <a:schemeClr val="bg1"/>
-                </a:solidFill>
-              </a:defRPr>
-            </a:lvl1pPr>
-          </a:lstStyle>
-          <a:p>
-            <a:r>
-              <a:rPr lang="en-GB" noProof="0" dirty="0"/>
-              <a:t>Divider slide</a:t>
-            </a:r>
-            <a:br>
-              <a:rPr lang="en-GB" noProof="0" dirty="0"/>
-            </a:br>
-            <a:r>
-              <a:rPr lang="en-GB" noProof="0" dirty="0"/>
-              <a:t>lorem ipsum </a:t>
-            </a:r>
-            <a:r>
-              <a:rPr lang="en-GB" noProof="0" dirty="0" err="1"/>
-              <a:t>uptir</a:t>
-            </a:r>
-            <a:endParaRPr lang="en-GB" noProof="0" dirty="0"/>
-          </a:p>
-        </p:txBody>
-      </p:sp>
-      <p:pic>
-        <p:nvPicPr>
-          <p:cNvPr id="4" name="Picture 3" descr="A picture containing text, clipart&#10;&#10;Description automatically generated">
-            <a:extLst>
-              <a:ext uri="{FF2B5EF4-FFF2-40B4-BE49-F238E27FC236}">
-                <a16:creationId xmlns:a16="http://schemas.microsoft.com/office/drawing/2014/main" id="{31E41DA4-A6FA-BA3D-ED80-DA8059C74055}"/>
-              </a:ext>
-            </a:extLst>
-          </p:cNvPr>
-          <p:cNvPicPr>
-            <a:picLocks noChangeAspect="1"/>
-          </p:cNvPicPr>
-          <p:nvPr/>
-        </p:nvPicPr>
-        <p:blipFill>
-          <a:blip r:embed="rId3"/>
-          <a:stretch>
-            <a:fillRect/>
-          </a:stretch>
-        </p:blipFill>
-        <p:spPr>
-          <a:xfrm>
-            <a:off x="10627162" y="6245846"/>
-            <a:ext cx="1330560" cy="432000"/>
-          </a:xfrm>
-          <a:prstGeom prst="rect">
-            <a:avLst/>
-          </a:prstGeom>
-        </p:spPr>
-      </p:pic>
-    </p:spTree>
-    <p:extLst>
-      <p:ext uri="{BB962C8B-B14F-4D97-AF65-F5344CB8AC3E}">
-        <p14:creationId xmlns:p14="http://schemas.microsoft.com/office/powerpoint/2010/main" val="2829569700"/>
-      </p:ext>
-    </p:extLst>
-  </p:cSld>
-  <p:clrMapOvr>
-    <a:masterClrMapping/>
-  </p:clrMapOvr>
-</p:sldLayout>
-</file>
-
-<file path=ppt/slideLayouts/slideLayout30.xml><?xml version="1.0" encoding="utf-8"?>
+<file path=ppt/slideLayouts/slideLayout31.xml><?xml version="1.0" encoding="utf-8"?>
 <p:sldLayout xmlns:a="http://schemas.openxmlformats.org/drawingml/2006/main" xmlns:r="http://schemas.openxmlformats.org/officeDocument/2006/relationships" xmlns:p="http://schemas.openxmlformats.org/presentationml/2006/main" preserve="1">
   <p:cSld name="5_TABLE SLIDE">
     <p:bg>
@@ -25571,7 +26029,7 @@
           <p:nvPr/>
         </p:nvPicPr>
         <p:blipFill>
-          <a:blip r:embed="rId17"/>
+          <a:blip r:embed="rId18"/>
           <a:stretch>
             <a:fillRect/>
           </a:stretch>
@@ -25602,14 +26060,15 @@
     <p:sldLayoutId id="2147483788" r:id="rId5"/>
     <p:sldLayoutId id="2147483789" r:id="rId6"/>
     <p:sldLayoutId id="2147483791" r:id="rId7"/>
-    <p:sldLayoutId id="2147483790" r:id="rId8"/>
-    <p:sldLayoutId id="2147483792" r:id="rId9"/>
-    <p:sldLayoutId id="2147483844" r:id="rId10"/>
-    <p:sldLayoutId id="2147483819" r:id="rId11"/>
-    <p:sldLayoutId id="2147483800" r:id="rId12"/>
-    <p:sldLayoutId id="2147483801" r:id="rId13"/>
-    <p:sldLayoutId id="2147483799" r:id="rId14"/>
-    <p:sldLayoutId id="2147483795" r:id="rId15"/>
+    <p:sldLayoutId id="2147483847" r:id="rId8"/>
+    <p:sldLayoutId id="2147483790" r:id="rId9"/>
+    <p:sldLayoutId id="2147483792" r:id="rId10"/>
+    <p:sldLayoutId id="2147483844" r:id="rId11"/>
+    <p:sldLayoutId id="2147483819" r:id="rId12"/>
+    <p:sldLayoutId id="2147483800" r:id="rId13"/>
+    <p:sldLayoutId id="2147483801" r:id="rId14"/>
+    <p:sldLayoutId id="2147483799" r:id="rId15"/>
+    <p:sldLayoutId id="2147483795" r:id="rId16"/>
   </p:sldLayoutIdLst>
   <p:hf sldNum="0" hdr="0" ftr="0"/>
   <p:txStyles>
@@ -26100,7 +26559,7 @@
           <a:p>
             <a:fld id="{173DEA02-80BC-4B4A-88AA-63BCC9943E88}" type="datetime3">
               <a:rPr lang="en-US" smtClean="0"/>
-              <a:t>31 August 2023</a:t>
+              <a:t>8 September 2023</a:t>
             </a:fld>
             <a:endParaRPr lang="en-GB" dirty="0"/>
           </a:p>

</xml_diff>